<commit_message>
change to Mind Managment
</commit_message>
<xml_diff>
--- a/Java.pptx
+++ b/Java.pptx
@@ -202,7 +202,7 @@
           <a:p>
             <a:fld id="{DA138970-91FA-43C7-A2C4-4F47DFBC178E}" type="datetimeFigureOut">
               <a:rPr lang="zh-CN" altLang="en-US" smtClean="0"/>
-              <a:t>2019/4/12</a:t>
+              <a:t>2019/4/15</a:t>
             </a:fld>
             <a:endParaRPr lang="zh-CN" altLang="en-US"/>
           </a:p>
@@ -2012,7 +2012,7 @@
           <a:p>
             <a:fld id="{1331EC2B-80D6-4C7C-9EC4-5505DA85B637}" type="datetimeFigureOut">
               <a:rPr lang="zh-CN" altLang="en-US" smtClean="0"/>
-              <a:t>2019/4/12</a:t>
+              <a:t>2019/4/15</a:t>
             </a:fld>
             <a:endParaRPr lang="zh-CN" altLang="en-US"/>
           </a:p>
@@ -2210,7 +2210,7 @@
           <a:p>
             <a:fld id="{1331EC2B-80D6-4C7C-9EC4-5505DA85B637}" type="datetimeFigureOut">
               <a:rPr lang="zh-CN" altLang="en-US" smtClean="0"/>
-              <a:t>2019/4/12</a:t>
+              <a:t>2019/4/15</a:t>
             </a:fld>
             <a:endParaRPr lang="zh-CN" altLang="en-US"/>
           </a:p>
@@ -2418,7 +2418,7 @@
           <a:p>
             <a:fld id="{1331EC2B-80D6-4C7C-9EC4-5505DA85B637}" type="datetimeFigureOut">
               <a:rPr lang="zh-CN" altLang="en-US" smtClean="0"/>
-              <a:t>2019/4/12</a:t>
+              <a:t>2019/4/15</a:t>
             </a:fld>
             <a:endParaRPr lang="zh-CN" altLang="en-US"/>
           </a:p>
@@ -2616,7 +2616,7 @@
           <a:p>
             <a:fld id="{1331EC2B-80D6-4C7C-9EC4-5505DA85B637}" type="datetimeFigureOut">
               <a:rPr lang="zh-CN" altLang="en-US" smtClean="0"/>
-              <a:t>2019/4/12</a:t>
+              <a:t>2019/4/15</a:t>
             </a:fld>
             <a:endParaRPr lang="zh-CN" altLang="en-US"/>
           </a:p>
@@ -2891,7 +2891,7 @@
           <a:p>
             <a:fld id="{1331EC2B-80D6-4C7C-9EC4-5505DA85B637}" type="datetimeFigureOut">
               <a:rPr lang="zh-CN" altLang="en-US" smtClean="0"/>
-              <a:t>2019/4/12</a:t>
+              <a:t>2019/4/15</a:t>
             </a:fld>
             <a:endParaRPr lang="zh-CN" altLang="en-US"/>
           </a:p>
@@ -3156,7 +3156,7 @@
           <a:p>
             <a:fld id="{1331EC2B-80D6-4C7C-9EC4-5505DA85B637}" type="datetimeFigureOut">
               <a:rPr lang="zh-CN" altLang="en-US" smtClean="0"/>
-              <a:t>2019/4/12</a:t>
+              <a:t>2019/4/15</a:t>
             </a:fld>
             <a:endParaRPr lang="zh-CN" altLang="en-US"/>
           </a:p>
@@ -3568,7 +3568,7 @@
           <a:p>
             <a:fld id="{1331EC2B-80D6-4C7C-9EC4-5505DA85B637}" type="datetimeFigureOut">
               <a:rPr lang="zh-CN" altLang="en-US" smtClean="0"/>
-              <a:t>2019/4/12</a:t>
+              <a:t>2019/4/15</a:t>
             </a:fld>
             <a:endParaRPr lang="zh-CN" altLang="en-US"/>
           </a:p>
@@ -3709,7 +3709,7 @@
           <a:p>
             <a:fld id="{1331EC2B-80D6-4C7C-9EC4-5505DA85B637}" type="datetimeFigureOut">
               <a:rPr lang="zh-CN" altLang="en-US" smtClean="0"/>
-              <a:t>2019/4/12</a:t>
+              <a:t>2019/4/15</a:t>
             </a:fld>
             <a:endParaRPr lang="zh-CN" altLang="en-US"/>
           </a:p>
@@ -3822,7 +3822,7 @@
           <a:p>
             <a:fld id="{1331EC2B-80D6-4C7C-9EC4-5505DA85B637}" type="datetimeFigureOut">
               <a:rPr lang="zh-CN" altLang="en-US" smtClean="0"/>
-              <a:t>2019/4/12</a:t>
+              <a:t>2019/4/15</a:t>
             </a:fld>
             <a:endParaRPr lang="zh-CN" altLang="en-US"/>
           </a:p>
@@ -4133,7 +4133,7 @@
           <a:p>
             <a:fld id="{1331EC2B-80D6-4C7C-9EC4-5505DA85B637}" type="datetimeFigureOut">
               <a:rPr lang="zh-CN" altLang="en-US" smtClean="0"/>
-              <a:t>2019/4/12</a:t>
+              <a:t>2019/4/15</a:t>
             </a:fld>
             <a:endParaRPr lang="zh-CN" altLang="en-US"/>
           </a:p>
@@ -4421,7 +4421,7 @@
           <a:p>
             <a:fld id="{1331EC2B-80D6-4C7C-9EC4-5505DA85B637}" type="datetimeFigureOut">
               <a:rPr lang="zh-CN" altLang="en-US" smtClean="0"/>
-              <a:t>2019/4/12</a:t>
+              <a:t>2019/4/15</a:t>
             </a:fld>
             <a:endParaRPr lang="zh-CN" altLang="en-US"/>
           </a:p>
@@ -4662,7 +4662,7 @@
           <a:p>
             <a:fld id="{1331EC2B-80D6-4C7C-9EC4-5505DA85B637}" type="datetimeFigureOut">
               <a:rPr lang="zh-CN" altLang="en-US" smtClean="0"/>
-              <a:t>2019/4/12</a:t>
+              <a:t>2019/4/15</a:t>
             </a:fld>
             <a:endParaRPr lang="zh-CN" altLang="en-US"/>
           </a:p>
@@ -13580,7 +13580,7 @@
         </p:nvSpPr>
         <p:spPr>
           <a:xfrm>
-            <a:off x="47135" y="39429"/>
+            <a:off x="0" y="70893"/>
             <a:ext cx="3291286" cy="369332"/>
           </a:xfrm>
           <a:prstGeom prst="rect">
@@ -13609,2000 +13609,6 @@
             <a:r>
               <a:rPr lang="zh-CN" altLang="en-US" b="1" dirty="0"/>
               <a:t>垃圾回收机制示意图</a:t>
-            </a:r>
-          </a:p>
-        </p:txBody>
-      </p:sp>
-      <p:grpSp>
-        <p:nvGrpSpPr>
-          <p:cNvPr id="109" name="组合 108">
-            <a:extLst>
-              <a:ext uri="{FF2B5EF4-FFF2-40B4-BE49-F238E27FC236}">
-                <a16:creationId xmlns:a16="http://schemas.microsoft.com/office/drawing/2014/main" id="{2C4FAE75-8F66-4314-B2CB-C1F241C376FE}"/>
-              </a:ext>
-            </a:extLst>
-          </p:cNvPr>
-          <p:cNvGrpSpPr/>
-          <p:nvPr/>
-        </p:nvGrpSpPr>
-        <p:grpSpPr>
-          <a:xfrm>
-            <a:off x="2859983" y="473535"/>
-            <a:ext cx="9062730" cy="5910929"/>
-            <a:chOff x="2052115" y="527312"/>
-            <a:chExt cx="9062730" cy="5910929"/>
-          </a:xfrm>
-        </p:grpSpPr>
-        <p:sp>
-          <p:nvSpPr>
-            <p:cNvPr id="9" name="矩形: 圆角 8">
-              <a:extLst>
-                <a:ext uri="{FF2B5EF4-FFF2-40B4-BE49-F238E27FC236}">
-                  <a16:creationId xmlns:a16="http://schemas.microsoft.com/office/drawing/2014/main" id="{F1A4D849-5775-4D4A-BEBA-EC1B50AC3DAA}"/>
-                </a:ext>
-              </a:extLst>
-            </p:cNvPr>
-            <p:cNvSpPr/>
-            <p:nvPr/>
-          </p:nvSpPr>
-          <p:spPr>
-            <a:xfrm>
-              <a:off x="6096000" y="888783"/>
-              <a:ext cx="1846555" cy="369332"/>
-            </a:xfrm>
-            <a:prstGeom prst="roundRect">
-              <a:avLst/>
-            </a:prstGeom>
-          </p:spPr>
-          <p:style>
-            <a:lnRef idx="2">
-              <a:schemeClr val="accent1"/>
-            </a:lnRef>
-            <a:fillRef idx="1">
-              <a:schemeClr val="lt1"/>
-            </a:fillRef>
-            <a:effectRef idx="0">
-              <a:schemeClr val="accent1"/>
-            </a:effectRef>
-            <a:fontRef idx="minor">
-              <a:schemeClr val="dk1"/>
-            </a:fontRef>
-          </p:style>
-          <p:txBody>
-            <a:bodyPr rtlCol="0" anchor="ctr"/>
-            <a:lstStyle/>
-            <a:p>
-              <a:pPr algn="ctr"/>
-              <a:r>
-                <a:rPr lang="en-US" altLang="zh-CN" sz="1200" dirty="0"/>
-                <a:t>User user1 =new User()</a:t>
-              </a:r>
-              <a:endParaRPr lang="zh-CN" altLang="en-US" sz="1200" dirty="0"/>
-            </a:p>
-          </p:txBody>
-        </p:sp>
-        <p:grpSp>
-          <p:nvGrpSpPr>
-            <p:cNvPr id="55" name="组合 54">
-              <a:extLst>
-                <a:ext uri="{FF2B5EF4-FFF2-40B4-BE49-F238E27FC236}">
-                  <a16:creationId xmlns:a16="http://schemas.microsoft.com/office/drawing/2014/main" id="{32B515CD-3E4C-4F74-BF7C-7BB1C06C4116}"/>
-                </a:ext>
-              </a:extLst>
-            </p:cNvPr>
-            <p:cNvGrpSpPr/>
-            <p:nvPr/>
-          </p:nvGrpSpPr>
-          <p:grpSpPr>
-            <a:xfrm>
-              <a:off x="2052115" y="527312"/>
-              <a:ext cx="2503502" cy="5811343"/>
-              <a:chOff x="2052115" y="527312"/>
-              <a:chExt cx="2503502" cy="5811343"/>
-            </a:xfrm>
-          </p:grpSpPr>
-          <p:grpSp>
-            <p:nvGrpSpPr>
-              <p:cNvPr id="13" name="组合 12">
-                <a:extLst>
-                  <a:ext uri="{FF2B5EF4-FFF2-40B4-BE49-F238E27FC236}">
-                    <a16:creationId xmlns:a16="http://schemas.microsoft.com/office/drawing/2014/main" id="{888382EE-BEAE-4920-8713-F24C3579F315}"/>
-                  </a:ext>
-                </a:extLst>
-              </p:cNvPr>
-              <p:cNvGrpSpPr/>
-              <p:nvPr/>
-            </p:nvGrpSpPr>
-            <p:grpSpPr>
-              <a:xfrm>
-                <a:off x="2709062" y="888676"/>
-                <a:ext cx="1846555" cy="5445309"/>
-                <a:chOff x="2630078" y="2326734"/>
-                <a:chExt cx="1036948" cy="3706421"/>
-              </a:xfrm>
-            </p:grpSpPr>
-            <p:sp>
-              <p:nvSpPr>
-                <p:cNvPr id="8" name="矩形 7">
-                  <a:extLst>
-                    <a:ext uri="{FF2B5EF4-FFF2-40B4-BE49-F238E27FC236}">
-                      <a16:creationId xmlns:a16="http://schemas.microsoft.com/office/drawing/2014/main" id="{D5661055-821F-424E-B719-62EDD20A6DA1}"/>
-                    </a:ext>
-                  </a:extLst>
-                </p:cNvPr>
-                <p:cNvSpPr/>
-                <p:nvPr/>
-              </p:nvSpPr>
-              <p:spPr>
-                <a:xfrm>
-                  <a:off x="2630078" y="2326734"/>
-                  <a:ext cx="1036948" cy="791852"/>
-                </a:xfrm>
-                <a:prstGeom prst="rect">
-                  <a:avLst/>
-                </a:prstGeom>
-                <a:ln w="12700">
-                  <a:solidFill>
-                    <a:schemeClr val="tx1"/>
-                  </a:solidFill>
-                </a:ln>
-              </p:spPr>
-              <p:style>
-                <a:lnRef idx="1">
-                  <a:schemeClr val="accent2"/>
-                </a:lnRef>
-                <a:fillRef idx="3">
-                  <a:schemeClr val="accent2"/>
-                </a:fillRef>
-                <a:effectRef idx="2">
-                  <a:schemeClr val="accent2"/>
-                </a:effectRef>
-                <a:fontRef idx="minor">
-                  <a:schemeClr val="lt1"/>
-                </a:fontRef>
-              </p:style>
-              <p:txBody>
-                <a:bodyPr rtlCol="0" anchor="ctr"/>
-                <a:lstStyle/>
-                <a:p>
-                  <a:pPr algn="ctr"/>
-                  <a:endParaRPr lang="en-US" altLang="zh-CN" sz="1400" dirty="0"/>
-                </a:p>
-                <a:p>
-                  <a:pPr algn="ctr"/>
-                  <a:endParaRPr lang="en-US" altLang="zh-CN" sz="1400" dirty="0"/>
-                </a:p>
-              </p:txBody>
-            </p:sp>
-            <p:sp>
-              <p:nvSpPr>
-                <p:cNvPr id="10" name="矩形 9">
-                  <a:extLst>
-                    <a:ext uri="{FF2B5EF4-FFF2-40B4-BE49-F238E27FC236}">
-                      <a16:creationId xmlns:a16="http://schemas.microsoft.com/office/drawing/2014/main" id="{7529750C-B3A6-41E8-885A-E0DEFA34B2CF}"/>
-                    </a:ext>
-                  </a:extLst>
-                </p:cNvPr>
-                <p:cNvSpPr/>
-                <p:nvPr/>
-              </p:nvSpPr>
-              <p:spPr>
-                <a:xfrm>
-                  <a:off x="2630078" y="3118586"/>
-                  <a:ext cx="1036948" cy="378758"/>
-                </a:xfrm>
-                <a:prstGeom prst="rect">
-                  <a:avLst/>
-                </a:prstGeom>
-                <a:solidFill>
-                  <a:srgbClr val="C00000"/>
-                </a:solidFill>
-                <a:ln w="12700">
-                  <a:solidFill>
-                    <a:schemeClr val="tx1"/>
-                  </a:solidFill>
-                </a:ln>
-              </p:spPr>
-              <p:style>
-                <a:lnRef idx="2">
-                  <a:schemeClr val="accent1">
-                    <a:shade val="50000"/>
-                  </a:schemeClr>
-                </a:lnRef>
-                <a:fillRef idx="1">
-                  <a:schemeClr val="accent1"/>
-                </a:fillRef>
-                <a:effectRef idx="0">
-                  <a:schemeClr val="accent1"/>
-                </a:effectRef>
-                <a:fontRef idx="minor">
-                  <a:schemeClr val="lt1"/>
-                </a:fontRef>
-              </p:style>
-              <p:txBody>
-                <a:bodyPr rtlCol="0" anchor="ctr"/>
-                <a:lstStyle/>
-                <a:p>
-                  <a:pPr algn="ctr"/>
-                  <a:endParaRPr lang="en-US" altLang="zh-CN" sz="1200" dirty="0"/>
-                </a:p>
-                <a:p>
-                  <a:pPr algn="ctr"/>
-                  <a:r>
-                    <a:rPr lang="en-US" altLang="zh-CN" sz="1200" dirty="0"/>
-                    <a:t>S0</a:t>
-                  </a:r>
-                  <a:r>
-                    <a:rPr lang="zh-CN" altLang="en-US" sz="1200" dirty="0"/>
-                    <a:t>和</a:t>
-                  </a:r>
-                  <a:r>
-                    <a:rPr lang="en-US" altLang="zh-CN" sz="1200" dirty="0"/>
-                    <a:t>S1</a:t>
-                  </a:r>
-                  <a:r>
-                    <a:rPr lang="zh-CN" altLang="en-US" sz="1200" dirty="0"/>
-                    <a:t>是互换的</a:t>
-                  </a:r>
-                </a:p>
-              </p:txBody>
-            </p:sp>
-            <p:sp>
-              <p:nvSpPr>
-                <p:cNvPr id="11" name="矩形 10">
-                  <a:extLst>
-                    <a:ext uri="{FF2B5EF4-FFF2-40B4-BE49-F238E27FC236}">
-                      <a16:creationId xmlns:a16="http://schemas.microsoft.com/office/drawing/2014/main" id="{D32170FB-9966-47D0-A332-E41F3F938A13}"/>
-                    </a:ext>
-                  </a:extLst>
-                </p:cNvPr>
-                <p:cNvSpPr/>
-                <p:nvPr/>
-              </p:nvSpPr>
-              <p:spPr>
-                <a:xfrm>
-                  <a:off x="2630078" y="3497344"/>
-                  <a:ext cx="1036948" cy="413094"/>
-                </a:xfrm>
-                <a:prstGeom prst="rect">
-                  <a:avLst/>
-                </a:prstGeom>
-                <a:solidFill>
-                  <a:srgbClr val="C00000"/>
-                </a:solidFill>
-                <a:ln w="12700">
-                  <a:solidFill>
-                    <a:schemeClr val="tx1"/>
-                  </a:solidFill>
-                </a:ln>
-              </p:spPr>
-              <p:style>
-                <a:lnRef idx="2">
-                  <a:schemeClr val="accent1">
-                    <a:shade val="50000"/>
-                  </a:schemeClr>
-                </a:lnRef>
-                <a:fillRef idx="1">
-                  <a:schemeClr val="accent1"/>
-                </a:fillRef>
-                <a:effectRef idx="0">
-                  <a:schemeClr val="accent1"/>
-                </a:effectRef>
-                <a:fontRef idx="minor">
-                  <a:schemeClr val="lt1"/>
-                </a:fontRef>
-              </p:style>
-              <p:txBody>
-                <a:bodyPr rtlCol="0" anchor="ctr"/>
-                <a:lstStyle/>
-                <a:p>
-                  <a:pPr algn="ctr"/>
-                  <a:r>
-                    <a:rPr lang="en-US" altLang="zh-CN" sz="1200" dirty="0"/>
-                    <a:t>S1</a:t>
-                  </a:r>
-                  <a:r>
-                    <a:rPr lang="zh-CN" altLang="en-US" sz="1200" dirty="0"/>
-                    <a:t>始终为空</a:t>
-                  </a:r>
-                </a:p>
-              </p:txBody>
-            </p:sp>
-            <p:sp>
-              <p:nvSpPr>
-                <p:cNvPr id="12" name="矩形 11">
-                  <a:extLst>
-                    <a:ext uri="{FF2B5EF4-FFF2-40B4-BE49-F238E27FC236}">
-                      <a16:creationId xmlns:a16="http://schemas.microsoft.com/office/drawing/2014/main" id="{C039B9DC-197A-4256-90CC-519800C2F01B}"/>
-                    </a:ext>
-                  </a:extLst>
-                </p:cNvPr>
-                <p:cNvSpPr/>
-                <p:nvPr/>
-              </p:nvSpPr>
-              <p:spPr>
-                <a:xfrm>
-                  <a:off x="2630078" y="3910437"/>
-                  <a:ext cx="1036948" cy="2122718"/>
-                </a:xfrm>
-                <a:prstGeom prst="rect">
-                  <a:avLst/>
-                </a:prstGeom>
-                <a:ln w="12700">
-                  <a:solidFill>
-                    <a:schemeClr val="tx1"/>
-                  </a:solidFill>
-                </a:ln>
-              </p:spPr>
-              <p:style>
-                <a:lnRef idx="1">
-                  <a:schemeClr val="accent3"/>
-                </a:lnRef>
-                <a:fillRef idx="3">
-                  <a:schemeClr val="accent3"/>
-                </a:fillRef>
-                <a:effectRef idx="2">
-                  <a:schemeClr val="accent3"/>
-                </a:effectRef>
-                <a:fontRef idx="minor">
-                  <a:schemeClr val="lt1"/>
-                </a:fontRef>
-              </p:style>
-              <p:txBody>
-                <a:bodyPr rtlCol="0" anchor="ctr"/>
-                <a:lstStyle/>
-                <a:p>
-                  <a:pPr algn="ctr"/>
-                  <a:endParaRPr lang="zh-CN" altLang="en-US" sz="1400" dirty="0"/>
-                </a:p>
-              </p:txBody>
-            </p:sp>
-          </p:grpSp>
-          <p:sp>
-            <p:nvSpPr>
-              <p:cNvPr id="2" name="左大括号 1">
-                <a:extLst>
-                  <a:ext uri="{FF2B5EF4-FFF2-40B4-BE49-F238E27FC236}">
-                    <a16:creationId xmlns:a16="http://schemas.microsoft.com/office/drawing/2014/main" id="{B15135C3-5C35-4D2A-9A64-F2B2BD4D9AA7}"/>
-                  </a:ext>
-                </a:extLst>
-              </p:cNvPr>
-              <p:cNvSpPr/>
-              <p:nvPr/>
-            </p:nvSpPr>
-            <p:spPr>
-              <a:xfrm>
-                <a:off x="2414726" y="893347"/>
-                <a:ext cx="294336" cy="2326705"/>
-              </a:xfrm>
-              <a:prstGeom prst="leftBrace">
-                <a:avLst/>
-              </a:prstGeom>
-            </p:spPr>
-            <p:style>
-              <a:lnRef idx="1">
-                <a:schemeClr val="accent1"/>
-              </a:lnRef>
-              <a:fillRef idx="0">
-                <a:schemeClr val="accent1"/>
-              </a:fillRef>
-              <a:effectRef idx="0">
-                <a:schemeClr val="accent1"/>
-              </a:effectRef>
-              <a:fontRef idx="minor">
-                <a:schemeClr val="tx1"/>
-              </a:fontRef>
-            </p:style>
-            <p:txBody>
-              <a:bodyPr rtlCol="0" anchor="ctr"/>
-              <a:lstStyle/>
-              <a:p>
-                <a:pPr algn="ctr"/>
-                <a:endParaRPr lang="zh-CN" altLang="en-US" dirty="0"/>
-              </a:p>
-            </p:txBody>
-          </p:sp>
-          <p:sp>
-            <p:nvSpPr>
-              <p:cNvPr id="32" name="左大括号 31">
-                <a:extLst>
-                  <a:ext uri="{FF2B5EF4-FFF2-40B4-BE49-F238E27FC236}">
-                    <a16:creationId xmlns:a16="http://schemas.microsoft.com/office/drawing/2014/main" id="{CE362E93-6033-4DCC-9C6D-112514013B40}"/>
-                  </a:ext>
-                </a:extLst>
-              </p:cNvPr>
-              <p:cNvSpPr/>
-              <p:nvPr/>
-            </p:nvSpPr>
-            <p:spPr>
-              <a:xfrm>
-                <a:off x="2414726" y="3220052"/>
-                <a:ext cx="294336" cy="3118603"/>
-              </a:xfrm>
-              <a:prstGeom prst="leftBrace">
-                <a:avLst/>
-              </a:prstGeom>
-            </p:spPr>
-            <p:style>
-              <a:lnRef idx="1">
-                <a:schemeClr val="accent1"/>
-              </a:lnRef>
-              <a:fillRef idx="0">
-                <a:schemeClr val="accent1"/>
-              </a:fillRef>
-              <a:effectRef idx="0">
-                <a:schemeClr val="accent1"/>
-              </a:effectRef>
-              <a:fontRef idx="minor">
-                <a:schemeClr val="tx1"/>
-              </a:fontRef>
-            </p:style>
-            <p:txBody>
-              <a:bodyPr rtlCol="0" anchor="ctr"/>
-              <a:lstStyle/>
-              <a:p>
-                <a:pPr algn="ctr"/>
-                <a:endParaRPr lang="zh-CN" altLang="en-US"/>
-              </a:p>
-            </p:txBody>
-          </p:sp>
-          <p:sp>
-            <p:nvSpPr>
-              <p:cNvPr id="3" name="文本框 2">
-                <a:extLst>
-                  <a:ext uri="{FF2B5EF4-FFF2-40B4-BE49-F238E27FC236}">
-                    <a16:creationId xmlns:a16="http://schemas.microsoft.com/office/drawing/2014/main" id="{86EDA522-321C-49CE-B97E-4C876FB3E837}"/>
-                  </a:ext>
-                </a:extLst>
-              </p:cNvPr>
-              <p:cNvSpPr txBox="1"/>
-              <p:nvPr/>
-            </p:nvSpPr>
-            <p:spPr>
-              <a:xfrm>
-                <a:off x="2052115" y="1696287"/>
-                <a:ext cx="430887" cy="707886"/>
-              </a:xfrm>
-              <a:prstGeom prst="rect">
-                <a:avLst/>
-              </a:prstGeom>
-              <a:noFill/>
-            </p:spPr>
-            <p:txBody>
-              <a:bodyPr vert="eaVert" wrap="none" rtlCol="0">
-                <a:spAutoFit/>
-              </a:bodyPr>
-              <a:lstStyle/>
-              <a:p>
-                <a:r>
-                  <a:rPr lang="zh-CN" altLang="en-US" sz="1600" dirty="0"/>
-                  <a:t>新生代</a:t>
-                </a:r>
-              </a:p>
-            </p:txBody>
-          </p:sp>
-          <p:sp>
-            <p:nvSpPr>
-              <p:cNvPr id="34" name="文本框 33">
-                <a:extLst>
-                  <a:ext uri="{FF2B5EF4-FFF2-40B4-BE49-F238E27FC236}">
-                    <a16:creationId xmlns:a16="http://schemas.microsoft.com/office/drawing/2014/main" id="{46456A63-AF68-49C3-8F55-502BE4B65113}"/>
-                  </a:ext>
-                </a:extLst>
-              </p:cNvPr>
-              <p:cNvSpPr txBox="1"/>
-              <p:nvPr/>
-            </p:nvSpPr>
-            <p:spPr>
-              <a:xfrm>
-                <a:off x="2055678" y="4423075"/>
-                <a:ext cx="430887" cy="707886"/>
-              </a:xfrm>
-              <a:prstGeom prst="rect">
-                <a:avLst/>
-              </a:prstGeom>
-              <a:noFill/>
-            </p:spPr>
-            <p:txBody>
-              <a:bodyPr vert="eaVert" wrap="none" rtlCol="0">
-                <a:spAutoFit/>
-              </a:bodyPr>
-              <a:lstStyle/>
-              <a:p>
-                <a:r>
-                  <a:rPr lang="zh-CN" altLang="en-US" sz="1600" dirty="0"/>
-                  <a:t>老年代</a:t>
-                </a:r>
-              </a:p>
-            </p:txBody>
-          </p:sp>
-          <p:sp>
-            <p:nvSpPr>
-              <p:cNvPr id="7" name="文本框 6">
-                <a:extLst>
-                  <a:ext uri="{FF2B5EF4-FFF2-40B4-BE49-F238E27FC236}">
-                    <a16:creationId xmlns:a16="http://schemas.microsoft.com/office/drawing/2014/main" id="{7F5DE130-74F4-425D-9D76-E5396B406BA5}"/>
-                  </a:ext>
-                </a:extLst>
-              </p:cNvPr>
-              <p:cNvSpPr txBox="1"/>
-              <p:nvPr/>
-            </p:nvSpPr>
-            <p:spPr>
-              <a:xfrm>
-                <a:off x="3412588" y="527312"/>
-                <a:ext cx="415498" cy="369332"/>
-              </a:xfrm>
-              <a:prstGeom prst="rect">
-                <a:avLst/>
-              </a:prstGeom>
-              <a:noFill/>
-            </p:spPr>
-            <p:txBody>
-              <a:bodyPr wrap="none" rtlCol="0">
-                <a:spAutoFit/>
-              </a:bodyPr>
-              <a:lstStyle/>
-              <a:p>
-                <a:r>
-                  <a:rPr lang="zh-CN" altLang="en-US" dirty="0"/>
-                  <a:t>堆</a:t>
-                </a:r>
-              </a:p>
-            </p:txBody>
-          </p:sp>
-          <p:sp>
-            <p:nvSpPr>
-              <p:cNvPr id="17" name="矩形: 圆角 16">
-                <a:extLst>
-                  <a:ext uri="{FF2B5EF4-FFF2-40B4-BE49-F238E27FC236}">
-                    <a16:creationId xmlns:a16="http://schemas.microsoft.com/office/drawing/2014/main" id="{FEDA6B9D-468F-407A-8E7F-706D4305C443}"/>
-                  </a:ext>
-                </a:extLst>
-              </p:cNvPr>
-              <p:cNvSpPr/>
-              <p:nvPr/>
-            </p:nvSpPr>
-            <p:spPr>
-              <a:xfrm>
-                <a:off x="2840059" y="1375404"/>
-                <a:ext cx="1560556" cy="323020"/>
-              </a:xfrm>
-              <a:prstGeom prst="roundRect">
-                <a:avLst/>
-              </a:prstGeom>
-            </p:spPr>
-            <p:style>
-              <a:lnRef idx="1">
-                <a:schemeClr val="accent6"/>
-              </a:lnRef>
-              <a:fillRef idx="3">
-                <a:schemeClr val="accent6"/>
-              </a:fillRef>
-              <a:effectRef idx="2">
-                <a:schemeClr val="accent6"/>
-              </a:effectRef>
-              <a:fontRef idx="minor">
-                <a:schemeClr val="lt1"/>
-              </a:fontRef>
-            </p:style>
-            <p:txBody>
-              <a:bodyPr rtlCol="0" anchor="ctr"/>
-              <a:lstStyle/>
-              <a:p>
-                <a:pPr algn="ctr"/>
-                <a:r>
-                  <a:rPr lang="en-US" altLang="zh-CN" sz="1200" dirty="0"/>
-                  <a:t>User {name=</a:t>
-                </a:r>
-                <a:r>
-                  <a:rPr lang="zh-CN" altLang="en-US" sz="1200" dirty="0"/>
-                  <a:t>‘张三’</a:t>
-                </a:r>
-                <a:r>
-                  <a:rPr lang="en-US" altLang="zh-CN" sz="1200" dirty="0"/>
-                  <a:t>}</a:t>
-                </a:r>
-              </a:p>
-            </p:txBody>
-          </p:sp>
-        </p:grpSp>
-        <p:cxnSp>
-          <p:nvCxnSpPr>
-            <p:cNvPr id="26" name="连接符: 肘形 25">
-              <a:extLst>
-                <a:ext uri="{FF2B5EF4-FFF2-40B4-BE49-F238E27FC236}">
-                  <a16:creationId xmlns:a16="http://schemas.microsoft.com/office/drawing/2014/main" id="{9C2058C2-63B6-4425-B3A8-6522FAB2A16F}"/>
-                </a:ext>
-              </a:extLst>
-            </p:cNvPr>
-            <p:cNvCxnSpPr>
-              <a:cxnSpLocks/>
-              <a:stCxn id="9" idx="1"/>
-              <a:endCxn id="17" idx="0"/>
-            </p:cNvCxnSpPr>
-            <p:nvPr/>
-          </p:nvCxnSpPr>
-          <p:spPr>
-            <a:xfrm rot="10800000" flipV="1">
-              <a:off x="3620338" y="1073448"/>
-              <a:ext cx="2475663" cy="301955"/>
-            </a:xfrm>
-            <a:prstGeom prst="bentConnector2">
-              <a:avLst/>
-            </a:prstGeom>
-            <a:ln>
-              <a:tailEnd type="triangle"/>
-            </a:ln>
-          </p:spPr>
-          <p:style>
-            <a:lnRef idx="1">
-              <a:schemeClr val="accent1"/>
-            </a:lnRef>
-            <a:fillRef idx="0">
-              <a:schemeClr val="accent1"/>
-            </a:fillRef>
-            <a:effectRef idx="0">
-              <a:schemeClr val="accent1"/>
-            </a:effectRef>
-            <a:fontRef idx="minor">
-              <a:schemeClr val="tx1"/>
-            </a:fontRef>
-          </p:style>
-        </p:cxnSp>
-        <p:grpSp>
-          <p:nvGrpSpPr>
-            <p:cNvPr id="56" name="组合 55">
-              <a:extLst>
-                <a:ext uri="{FF2B5EF4-FFF2-40B4-BE49-F238E27FC236}">
-                  <a16:creationId xmlns:a16="http://schemas.microsoft.com/office/drawing/2014/main" id="{B08ED032-CD5A-4D81-834A-A3455C4C0B0E}"/>
-                </a:ext>
-              </a:extLst>
-            </p:cNvPr>
-            <p:cNvGrpSpPr/>
-            <p:nvPr/>
-          </p:nvGrpSpPr>
-          <p:grpSpPr>
-            <a:xfrm>
-              <a:off x="9268290" y="536140"/>
-              <a:ext cx="1846555" cy="5802515"/>
-              <a:chOff x="9268290" y="536140"/>
-              <a:chExt cx="1846555" cy="5802515"/>
-            </a:xfrm>
-          </p:grpSpPr>
-          <p:sp>
-            <p:nvSpPr>
-              <p:cNvPr id="5" name="矩形 4">
-                <a:extLst>
-                  <a:ext uri="{FF2B5EF4-FFF2-40B4-BE49-F238E27FC236}">
-                    <a16:creationId xmlns:a16="http://schemas.microsoft.com/office/drawing/2014/main" id="{585D7B2D-5A8C-45B6-8532-9D8D57FD9A26}"/>
-                  </a:ext>
-                </a:extLst>
-              </p:cNvPr>
-              <p:cNvSpPr/>
-              <p:nvPr/>
-            </p:nvSpPr>
-            <p:spPr>
-              <a:xfrm>
-                <a:off x="9268290" y="893347"/>
-                <a:ext cx="1846555" cy="5445308"/>
-              </a:xfrm>
-              <a:prstGeom prst="rect">
-                <a:avLst/>
-              </a:prstGeom>
-              <a:solidFill>
-                <a:schemeClr val="accent6">
-                  <a:lumMod val="40000"/>
-                  <a:lumOff val="60000"/>
-                </a:schemeClr>
-              </a:solidFill>
-            </p:spPr>
-            <p:style>
-              <a:lnRef idx="2">
-                <a:schemeClr val="accent1">
-                  <a:shade val="50000"/>
-                </a:schemeClr>
-              </a:lnRef>
-              <a:fillRef idx="1">
-                <a:schemeClr val="accent1"/>
-              </a:fillRef>
-              <a:effectRef idx="0">
-                <a:schemeClr val="accent1"/>
-              </a:effectRef>
-              <a:fontRef idx="minor">
-                <a:schemeClr val="lt1"/>
-              </a:fontRef>
-            </p:style>
-            <p:txBody>
-              <a:bodyPr rtlCol="0" anchor="ctr"/>
-              <a:lstStyle/>
-              <a:p>
-                <a:pPr algn="ctr"/>
-                <a:endParaRPr lang="zh-CN" altLang="en-US"/>
-              </a:p>
-            </p:txBody>
-          </p:sp>
-          <p:sp>
-            <p:nvSpPr>
-              <p:cNvPr id="38" name="文本框 37">
-                <a:extLst>
-                  <a:ext uri="{FF2B5EF4-FFF2-40B4-BE49-F238E27FC236}">
-                    <a16:creationId xmlns:a16="http://schemas.microsoft.com/office/drawing/2014/main" id="{1D076E1C-6617-4723-9007-110BD9E91620}"/>
-                  </a:ext>
-                </a:extLst>
-              </p:cNvPr>
-              <p:cNvSpPr txBox="1"/>
-              <p:nvPr/>
-            </p:nvSpPr>
-            <p:spPr>
-              <a:xfrm>
-                <a:off x="9983818" y="536140"/>
-                <a:ext cx="415498" cy="369332"/>
-              </a:xfrm>
-              <a:prstGeom prst="rect">
-                <a:avLst/>
-              </a:prstGeom>
-              <a:noFill/>
-            </p:spPr>
-            <p:txBody>
-              <a:bodyPr wrap="none" rtlCol="0">
-                <a:spAutoFit/>
-              </a:bodyPr>
-              <a:lstStyle/>
-              <a:p>
-                <a:r>
-                  <a:rPr lang="zh-CN" altLang="en-US" dirty="0"/>
-                  <a:t>栈</a:t>
-                </a:r>
-              </a:p>
-            </p:txBody>
-          </p:sp>
-          <p:sp>
-            <p:nvSpPr>
-              <p:cNvPr id="45" name="矩形: 圆角 44">
-                <a:extLst>
-                  <a:ext uri="{FF2B5EF4-FFF2-40B4-BE49-F238E27FC236}">
-                    <a16:creationId xmlns:a16="http://schemas.microsoft.com/office/drawing/2014/main" id="{9824E838-E8CC-4800-8EF5-C7B632343A70}"/>
-                  </a:ext>
-                </a:extLst>
-              </p:cNvPr>
-              <p:cNvSpPr/>
-              <p:nvPr/>
-            </p:nvSpPr>
-            <p:spPr>
-              <a:xfrm>
-                <a:off x="9448534" y="1375404"/>
-                <a:ext cx="1560556" cy="323020"/>
-              </a:xfrm>
-              <a:prstGeom prst="roundRect">
-                <a:avLst/>
-              </a:prstGeom>
-            </p:spPr>
-            <p:style>
-              <a:lnRef idx="1">
-                <a:schemeClr val="accent6"/>
-              </a:lnRef>
-              <a:fillRef idx="3">
-                <a:schemeClr val="accent6"/>
-              </a:fillRef>
-              <a:effectRef idx="2">
-                <a:schemeClr val="accent6"/>
-              </a:effectRef>
-              <a:fontRef idx="minor">
-                <a:schemeClr val="lt1"/>
-              </a:fontRef>
-            </p:style>
-            <p:txBody>
-              <a:bodyPr rtlCol="0" anchor="ctr"/>
-              <a:lstStyle/>
-              <a:p>
-                <a:pPr algn="ctr"/>
-                <a:r>
-                  <a:rPr lang="en-US" altLang="zh-CN" sz="1200" dirty="0"/>
-                  <a:t>user1</a:t>
-                </a:r>
-              </a:p>
-            </p:txBody>
-          </p:sp>
-        </p:grpSp>
-        <p:cxnSp>
-          <p:nvCxnSpPr>
-            <p:cNvPr id="43" name="连接符: 肘形 42">
-              <a:extLst>
-                <a:ext uri="{FF2B5EF4-FFF2-40B4-BE49-F238E27FC236}">
-                  <a16:creationId xmlns:a16="http://schemas.microsoft.com/office/drawing/2014/main" id="{F8C4D271-0E44-4B07-A91A-05983A59BF8D}"/>
-                </a:ext>
-              </a:extLst>
-            </p:cNvPr>
-            <p:cNvCxnSpPr>
-              <a:cxnSpLocks/>
-              <a:stCxn id="9" idx="3"/>
-              <a:endCxn id="45" idx="0"/>
-            </p:cNvCxnSpPr>
-            <p:nvPr/>
-          </p:nvCxnSpPr>
-          <p:spPr>
-            <a:xfrm>
-              <a:off x="7942555" y="1073449"/>
-              <a:ext cx="2286257" cy="301955"/>
-            </a:xfrm>
-            <a:prstGeom prst="bentConnector2">
-              <a:avLst/>
-            </a:prstGeom>
-            <a:ln>
-              <a:tailEnd type="triangle"/>
-            </a:ln>
-          </p:spPr>
-          <p:style>
-            <a:lnRef idx="1">
-              <a:schemeClr val="accent1"/>
-            </a:lnRef>
-            <a:fillRef idx="0">
-              <a:schemeClr val="accent1"/>
-            </a:fillRef>
-            <a:effectRef idx="0">
-              <a:schemeClr val="accent1"/>
-            </a:effectRef>
-            <a:fontRef idx="minor">
-              <a:schemeClr val="tx1"/>
-            </a:fontRef>
-          </p:style>
-        </p:cxnSp>
-        <p:cxnSp>
-          <p:nvCxnSpPr>
-            <p:cNvPr id="46" name="直接箭头连接符 45">
-              <a:extLst>
-                <a:ext uri="{FF2B5EF4-FFF2-40B4-BE49-F238E27FC236}">
-                  <a16:creationId xmlns:a16="http://schemas.microsoft.com/office/drawing/2014/main" id="{1796C92D-6632-498B-B60A-E9983D587A9D}"/>
-                </a:ext>
-              </a:extLst>
-            </p:cNvPr>
-            <p:cNvCxnSpPr>
-              <a:cxnSpLocks/>
-              <a:stCxn id="45" idx="1"/>
-              <a:endCxn id="17" idx="3"/>
-            </p:cNvCxnSpPr>
-            <p:nvPr/>
-          </p:nvCxnSpPr>
-          <p:spPr>
-            <a:xfrm flipH="1">
-              <a:off x="4400615" y="1536914"/>
-              <a:ext cx="5047919" cy="0"/>
-            </a:xfrm>
-            <a:prstGeom prst="straightConnector1">
-              <a:avLst/>
-            </a:prstGeom>
-            <a:ln>
-              <a:tailEnd type="triangle"/>
-            </a:ln>
-          </p:spPr>
-          <p:style>
-            <a:lnRef idx="1">
-              <a:schemeClr val="accent1"/>
-            </a:lnRef>
-            <a:fillRef idx="0">
-              <a:schemeClr val="accent1"/>
-            </a:fillRef>
-            <a:effectRef idx="0">
-              <a:schemeClr val="accent1"/>
-            </a:effectRef>
-            <a:fontRef idx="minor">
-              <a:schemeClr val="tx1"/>
-            </a:fontRef>
-          </p:style>
-        </p:cxnSp>
-        <p:sp>
-          <p:nvSpPr>
-            <p:cNvPr id="54" name="文本框 53">
-              <a:extLst>
-                <a:ext uri="{FF2B5EF4-FFF2-40B4-BE49-F238E27FC236}">
-                  <a16:creationId xmlns:a16="http://schemas.microsoft.com/office/drawing/2014/main" id="{08634D36-AC53-4E01-9B29-5ADAB651CEC1}"/>
-                </a:ext>
-              </a:extLst>
-            </p:cNvPr>
-            <p:cNvSpPr txBox="1"/>
-            <p:nvPr/>
-          </p:nvSpPr>
-          <p:spPr>
-            <a:xfrm>
-              <a:off x="6156778" y="1336859"/>
-              <a:ext cx="1510350" cy="400110"/>
-            </a:xfrm>
-            <a:prstGeom prst="rect">
-              <a:avLst/>
-            </a:prstGeom>
-            <a:noFill/>
-          </p:spPr>
-          <p:txBody>
-            <a:bodyPr wrap="none" rtlCol="0">
-              <a:spAutoFit/>
-            </a:bodyPr>
-            <a:lstStyle/>
-            <a:p>
-              <a:r>
-                <a:rPr lang="zh-CN" altLang="en-US" sz="1000" dirty="0"/>
-                <a:t>局部变量</a:t>
-              </a:r>
-              <a:r>
-                <a:rPr lang="en-US" altLang="zh-CN" sz="1000" dirty="0"/>
-                <a:t>user1</a:t>
-              </a:r>
-              <a:r>
-                <a:rPr lang="zh-CN" altLang="en-US" sz="1000" dirty="0"/>
-                <a:t>指针指向</a:t>
-              </a:r>
-              <a:endParaRPr lang="en-US" altLang="zh-CN" sz="1000" dirty="0"/>
-            </a:p>
-            <a:p>
-              <a:r>
-                <a:rPr lang="zh-CN" altLang="en-US" sz="1000" dirty="0"/>
-                <a:t>堆中对象的实例</a:t>
-              </a:r>
-            </a:p>
-          </p:txBody>
-        </p:sp>
-        <p:sp>
-          <p:nvSpPr>
-            <p:cNvPr id="61" name="文本框 60">
-              <a:extLst>
-                <a:ext uri="{FF2B5EF4-FFF2-40B4-BE49-F238E27FC236}">
-                  <a16:creationId xmlns:a16="http://schemas.microsoft.com/office/drawing/2014/main" id="{D558D7F8-2A38-4F83-AF3C-ED3994D70856}"/>
-                </a:ext>
-              </a:extLst>
-            </p:cNvPr>
-            <p:cNvSpPr txBox="1"/>
-            <p:nvPr/>
-          </p:nvSpPr>
-          <p:spPr>
-            <a:xfrm>
-              <a:off x="4597753" y="873391"/>
-              <a:ext cx="1484702" cy="400110"/>
-            </a:xfrm>
-            <a:prstGeom prst="rect">
-              <a:avLst/>
-            </a:prstGeom>
-            <a:noFill/>
-          </p:spPr>
-          <p:txBody>
-            <a:bodyPr wrap="none" rtlCol="0">
-              <a:spAutoFit/>
-            </a:bodyPr>
-            <a:lstStyle/>
-            <a:p>
-              <a:r>
-                <a:rPr lang="zh-CN" altLang="en-US" sz="1000" dirty="0"/>
-                <a:t>新</a:t>
-              </a:r>
-              <a:r>
-                <a:rPr lang="en-US" altLang="zh-CN" sz="1000" dirty="0"/>
-                <a:t>new</a:t>
-              </a:r>
-              <a:r>
-                <a:rPr lang="zh-CN" altLang="en-US" sz="1000" dirty="0"/>
-                <a:t>的对象实例数据</a:t>
-              </a:r>
-              <a:endParaRPr lang="en-US" altLang="zh-CN" sz="1000" dirty="0"/>
-            </a:p>
-            <a:p>
-              <a:r>
-                <a:rPr lang="zh-CN" altLang="en-US" sz="1000" dirty="0"/>
-                <a:t>存放在堆中的</a:t>
-              </a:r>
-              <a:r>
-                <a:rPr lang="en-US" altLang="zh-CN" sz="1000" dirty="0"/>
-                <a:t>Eden</a:t>
-              </a:r>
-              <a:r>
-                <a:rPr lang="zh-CN" altLang="en-US" sz="1000" dirty="0"/>
-                <a:t>区域</a:t>
-              </a:r>
-            </a:p>
-          </p:txBody>
-        </p:sp>
-        <p:sp>
-          <p:nvSpPr>
-            <p:cNvPr id="62" name="文本框 61">
-              <a:extLst>
-                <a:ext uri="{FF2B5EF4-FFF2-40B4-BE49-F238E27FC236}">
-                  <a16:creationId xmlns:a16="http://schemas.microsoft.com/office/drawing/2014/main" id="{C88A6E63-2D43-46C5-ABA7-8BED262F6862}"/>
-                </a:ext>
-              </a:extLst>
-            </p:cNvPr>
-            <p:cNvSpPr txBox="1"/>
-            <p:nvPr/>
-          </p:nvSpPr>
-          <p:spPr>
-            <a:xfrm>
-              <a:off x="8002081" y="856427"/>
-              <a:ext cx="1180131" cy="400110"/>
-            </a:xfrm>
-            <a:prstGeom prst="rect">
-              <a:avLst/>
-            </a:prstGeom>
-            <a:noFill/>
-          </p:spPr>
-          <p:txBody>
-            <a:bodyPr wrap="none" rtlCol="0">
-              <a:spAutoFit/>
-            </a:bodyPr>
-            <a:lstStyle/>
-            <a:p>
-              <a:r>
-                <a:rPr lang="zh-CN" altLang="en-US" sz="1000" dirty="0"/>
-                <a:t>新</a:t>
-              </a:r>
-              <a:r>
-                <a:rPr lang="en-US" altLang="zh-CN" sz="1000" dirty="0"/>
-                <a:t>new</a:t>
-              </a:r>
-              <a:r>
-                <a:rPr lang="zh-CN" altLang="en-US" sz="1000" dirty="0"/>
-                <a:t>的局部变量</a:t>
-              </a:r>
-              <a:endParaRPr lang="en-US" altLang="zh-CN" sz="1000" dirty="0"/>
-            </a:p>
-            <a:p>
-              <a:r>
-                <a:rPr lang="en-US" altLang="zh-CN" sz="1000" dirty="0"/>
-                <a:t>user1</a:t>
-              </a:r>
-              <a:r>
-                <a:rPr lang="zh-CN" altLang="en-US" sz="1000" dirty="0"/>
-                <a:t>存放在栈中</a:t>
-              </a:r>
-            </a:p>
-          </p:txBody>
-        </p:sp>
-        <p:sp>
-          <p:nvSpPr>
-            <p:cNvPr id="65" name="矩形: 圆角 64">
-              <a:extLst>
-                <a:ext uri="{FF2B5EF4-FFF2-40B4-BE49-F238E27FC236}">
-                  <a16:creationId xmlns:a16="http://schemas.microsoft.com/office/drawing/2014/main" id="{F5D374C2-3B4C-4EED-ACE5-BF2E5BA62103}"/>
-                </a:ext>
-              </a:extLst>
-            </p:cNvPr>
-            <p:cNvSpPr/>
-            <p:nvPr/>
-          </p:nvSpPr>
-          <p:spPr>
-            <a:xfrm>
-              <a:off x="2861028" y="3374277"/>
-              <a:ext cx="1560556" cy="323020"/>
-            </a:xfrm>
-            <a:prstGeom prst="roundRect">
-              <a:avLst/>
-            </a:prstGeom>
-          </p:spPr>
-          <p:style>
-            <a:lnRef idx="1">
-              <a:schemeClr val="accent6"/>
-            </a:lnRef>
-            <a:fillRef idx="3">
-              <a:schemeClr val="accent6"/>
-            </a:fillRef>
-            <a:effectRef idx="2">
-              <a:schemeClr val="accent6"/>
-            </a:effectRef>
-            <a:fontRef idx="minor">
-              <a:schemeClr val="lt1"/>
-            </a:fontRef>
-          </p:style>
-          <p:txBody>
-            <a:bodyPr rtlCol="0" anchor="ctr"/>
-            <a:lstStyle/>
-            <a:p>
-              <a:pPr algn="ctr"/>
-              <a:r>
-                <a:rPr lang="en-US" altLang="zh-CN" sz="1200" dirty="0"/>
-                <a:t>Employee {age=20}</a:t>
-              </a:r>
-            </a:p>
-          </p:txBody>
-        </p:sp>
-        <p:sp>
-          <p:nvSpPr>
-            <p:cNvPr id="66" name="矩形: 圆角 65">
-              <a:extLst>
-                <a:ext uri="{FF2B5EF4-FFF2-40B4-BE49-F238E27FC236}">
-                  <a16:creationId xmlns:a16="http://schemas.microsoft.com/office/drawing/2014/main" id="{443B33C8-FE0D-45D2-AAF2-15374577653C}"/>
-                </a:ext>
-              </a:extLst>
-            </p:cNvPr>
-            <p:cNvSpPr/>
-            <p:nvPr/>
-          </p:nvSpPr>
-          <p:spPr>
-            <a:xfrm>
-              <a:off x="2861028" y="3812712"/>
-              <a:ext cx="1560556" cy="323020"/>
-            </a:xfrm>
-            <a:prstGeom prst="roundRect">
-              <a:avLst/>
-            </a:prstGeom>
-          </p:spPr>
-          <p:style>
-            <a:lnRef idx="1">
-              <a:schemeClr val="accent6"/>
-            </a:lnRef>
-            <a:fillRef idx="3">
-              <a:schemeClr val="accent6"/>
-            </a:fillRef>
-            <a:effectRef idx="2">
-              <a:schemeClr val="accent6"/>
-            </a:effectRef>
-            <a:fontRef idx="minor">
-              <a:schemeClr val="lt1"/>
-            </a:fontRef>
-          </p:style>
-          <p:txBody>
-            <a:bodyPr rtlCol="0" anchor="ctr"/>
-            <a:lstStyle/>
-            <a:p>
-              <a:pPr algn="ctr"/>
-              <a:r>
-                <a:rPr lang="en-US" altLang="zh-CN" sz="1200" dirty="0"/>
-                <a:t>[1,2,3,4,5]</a:t>
-              </a:r>
-            </a:p>
-          </p:txBody>
-        </p:sp>
-        <p:sp>
-          <p:nvSpPr>
-            <p:cNvPr id="71" name="文本框 70">
-              <a:extLst>
-                <a:ext uri="{FF2B5EF4-FFF2-40B4-BE49-F238E27FC236}">
-                  <a16:creationId xmlns:a16="http://schemas.microsoft.com/office/drawing/2014/main" id="{9A91630B-8B6D-44E1-BAF4-63F68D3B1DC2}"/>
-                </a:ext>
-              </a:extLst>
-            </p:cNvPr>
-            <p:cNvSpPr txBox="1"/>
-            <p:nvPr/>
-          </p:nvSpPr>
-          <p:spPr>
-            <a:xfrm>
-              <a:off x="2707660" y="888552"/>
-              <a:ext cx="585417" cy="307777"/>
-            </a:xfrm>
-            <a:prstGeom prst="rect">
-              <a:avLst/>
-            </a:prstGeom>
-            <a:noFill/>
-          </p:spPr>
-          <p:txBody>
-            <a:bodyPr wrap="none" rtlCol="0">
-              <a:spAutoFit/>
-            </a:bodyPr>
-            <a:lstStyle/>
-            <a:p>
-              <a:r>
-                <a:rPr lang="en-US" altLang="zh-CN" sz="1400" b="1" dirty="0"/>
-                <a:t>Eden</a:t>
-              </a:r>
-              <a:endParaRPr lang="zh-CN" altLang="en-US" sz="1400" b="1" dirty="0"/>
-            </a:p>
-          </p:txBody>
-        </p:sp>
-        <p:sp>
-          <p:nvSpPr>
-            <p:cNvPr id="77" name="文本框 76">
-              <a:extLst>
-                <a:ext uri="{FF2B5EF4-FFF2-40B4-BE49-F238E27FC236}">
-                  <a16:creationId xmlns:a16="http://schemas.microsoft.com/office/drawing/2014/main" id="{B1224A4B-B2A6-4608-98A4-FB1F70ACFE12}"/>
-                </a:ext>
-              </a:extLst>
-            </p:cNvPr>
-            <p:cNvSpPr txBox="1"/>
-            <p:nvPr/>
-          </p:nvSpPr>
-          <p:spPr>
-            <a:xfrm>
-              <a:off x="2706027" y="2060067"/>
-              <a:ext cx="922047" cy="307777"/>
-            </a:xfrm>
-            <a:prstGeom prst="rect">
-              <a:avLst/>
-            </a:prstGeom>
-            <a:noFill/>
-          </p:spPr>
-          <p:txBody>
-            <a:bodyPr wrap="none" rtlCol="0">
-              <a:spAutoFit/>
-            </a:bodyPr>
-            <a:lstStyle/>
-            <a:p>
-              <a:r>
-                <a:rPr lang="en-US" altLang="zh-CN" sz="1400" b="1" dirty="0"/>
-                <a:t>From(S0)</a:t>
-              </a:r>
-              <a:endParaRPr lang="zh-CN" altLang="en-US" sz="1400" b="1" dirty="0"/>
-            </a:p>
-          </p:txBody>
-        </p:sp>
-        <p:sp>
-          <p:nvSpPr>
-            <p:cNvPr id="78" name="文本框 77">
-              <a:extLst>
-                <a:ext uri="{FF2B5EF4-FFF2-40B4-BE49-F238E27FC236}">
-                  <a16:creationId xmlns:a16="http://schemas.microsoft.com/office/drawing/2014/main" id="{0EDE7B4D-FA88-4AB5-AE8C-E580F955D9B5}"/>
-                </a:ext>
-              </a:extLst>
-            </p:cNvPr>
-            <p:cNvSpPr txBox="1"/>
-            <p:nvPr/>
-          </p:nvSpPr>
-          <p:spPr>
-            <a:xfrm>
-              <a:off x="2708494" y="2612422"/>
-              <a:ext cx="707245" cy="307777"/>
-            </a:xfrm>
-            <a:prstGeom prst="rect">
-              <a:avLst/>
-            </a:prstGeom>
-            <a:noFill/>
-          </p:spPr>
-          <p:txBody>
-            <a:bodyPr wrap="none" rtlCol="0">
-              <a:spAutoFit/>
-            </a:bodyPr>
-            <a:lstStyle/>
-            <a:p>
-              <a:r>
-                <a:rPr lang="en-US" altLang="zh-CN" sz="1400" b="1" dirty="0"/>
-                <a:t>To(S1)</a:t>
-              </a:r>
-              <a:endParaRPr lang="zh-CN" altLang="en-US" sz="1400" b="1" dirty="0"/>
-            </a:p>
-          </p:txBody>
-        </p:sp>
-        <p:sp>
-          <p:nvSpPr>
-            <p:cNvPr id="72" name="椭圆 71">
-              <a:extLst>
-                <a:ext uri="{FF2B5EF4-FFF2-40B4-BE49-F238E27FC236}">
-                  <a16:creationId xmlns:a16="http://schemas.microsoft.com/office/drawing/2014/main" id="{F60780E2-1308-41D1-8EFA-EB6BF65D8FE8}"/>
-                </a:ext>
-              </a:extLst>
-            </p:cNvPr>
-            <p:cNvSpPr/>
-            <p:nvPr/>
-          </p:nvSpPr>
-          <p:spPr>
-            <a:xfrm>
-              <a:off x="6652556" y="2858181"/>
-              <a:ext cx="769179" cy="726162"/>
-            </a:xfrm>
-            <a:prstGeom prst="ellipse">
-              <a:avLst/>
-            </a:prstGeom>
-          </p:spPr>
-          <p:style>
-            <a:lnRef idx="2">
-              <a:schemeClr val="accent1">
-                <a:shade val="50000"/>
-              </a:schemeClr>
-            </a:lnRef>
-            <a:fillRef idx="1">
-              <a:schemeClr val="accent1"/>
-            </a:fillRef>
-            <a:effectRef idx="0">
-              <a:schemeClr val="accent1"/>
-            </a:effectRef>
-            <a:fontRef idx="minor">
-              <a:schemeClr val="lt1"/>
-            </a:fontRef>
-          </p:style>
-          <p:txBody>
-            <a:bodyPr rtlCol="0" anchor="ctr"/>
-            <a:lstStyle/>
-            <a:p>
-              <a:pPr algn="ctr"/>
-              <a:r>
-                <a:rPr lang="en-US" altLang="zh-CN" dirty="0"/>
-                <a:t>GC</a:t>
-              </a:r>
-              <a:endParaRPr lang="zh-CN" altLang="en-US" dirty="0"/>
-            </a:p>
-          </p:txBody>
-        </p:sp>
-        <p:cxnSp>
-          <p:nvCxnSpPr>
-            <p:cNvPr id="75" name="连接符: 肘形 74">
-              <a:extLst>
-                <a:ext uri="{FF2B5EF4-FFF2-40B4-BE49-F238E27FC236}">
-                  <a16:creationId xmlns:a16="http://schemas.microsoft.com/office/drawing/2014/main" id="{638D0A4A-7294-4182-93C3-D7C2B2E96145}"/>
-                </a:ext>
-              </a:extLst>
-            </p:cNvPr>
-            <p:cNvCxnSpPr>
-              <a:cxnSpLocks/>
-              <a:stCxn id="72" idx="2"/>
-            </p:cNvCxnSpPr>
-            <p:nvPr/>
-          </p:nvCxnSpPr>
-          <p:spPr>
-            <a:xfrm rot="10800000" flipV="1">
-              <a:off x="4555622" y="3221262"/>
-              <a:ext cx="2096935" cy="908616"/>
-            </a:xfrm>
-            <a:prstGeom prst="bentConnector3">
-              <a:avLst/>
-            </a:prstGeom>
-            <a:ln>
-              <a:tailEnd type="triangle"/>
-            </a:ln>
-          </p:spPr>
-          <p:style>
-            <a:lnRef idx="1">
-              <a:schemeClr val="accent1"/>
-            </a:lnRef>
-            <a:fillRef idx="0">
-              <a:schemeClr val="accent1"/>
-            </a:fillRef>
-            <a:effectRef idx="0">
-              <a:schemeClr val="accent1"/>
-            </a:effectRef>
-            <a:fontRef idx="minor">
-              <a:schemeClr val="tx1"/>
-            </a:fontRef>
-          </p:style>
-        </p:cxnSp>
-        <p:sp>
-          <p:nvSpPr>
-            <p:cNvPr id="88" name="文本框 87">
-              <a:extLst>
-                <a:ext uri="{FF2B5EF4-FFF2-40B4-BE49-F238E27FC236}">
-                  <a16:creationId xmlns:a16="http://schemas.microsoft.com/office/drawing/2014/main" id="{77FECEFD-81B0-4A31-91DC-25D9889082C9}"/>
-                </a:ext>
-              </a:extLst>
-            </p:cNvPr>
-            <p:cNvSpPr txBox="1"/>
-            <p:nvPr/>
-          </p:nvSpPr>
-          <p:spPr>
-            <a:xfrm>
-              <a:off x="4695102" y="3285704"/>
-              <a:ext cx="1957452" cy="1323439"/>
-            </a:xfrm>
-            <a:prstGeom prst="rect">
-              <a:avLst/>
-            </a:prstGeom>
-            <a:noFill/>
-          </p:spPr>
-          <p:txBody>
-            <a:bodyPr wrap="square" rtlCol="0">
-              <a:spAutoFit/>
-            </a:bodyPr>
-            <a:lstStyle/>
-            <a:p>
-              <a:r>
-                <a:rPr lang="zh-CN" altLang="en-US" sz="1000" b="1" dirty="0"/>
-                <a:t>分代收集算法</a:t>
-              </a:r>
-              <a:endParaRPr lang="en-US" altLang="zh-CN" sz="1000" dirty="0"/>
-            </a:p>
-            <a:p>
-              <a:r>
-                <a:rPr lang="zh-CN" altLang="en-US" sz="1000" dirty="0"/>
-                <a:t>每次</a:t>
-              </a:r>
-              <a:r>
-                <a:rPr lang="en-US" altLang="zh-CN" sz="1000" dirty="0"/>
-                <a:t>GC</a:t>
-              </a:r>
-              <a:r>
-                <a:rPr lang="zh-CN" altLang="en-US" sz="1000" dirty="0"/>
-                <a:t>一次新生代，判断对象有没有被引用如果对象被引用则年龄</a:t>
-              </a:r>
-              <a:r>
-                <a:rPr lang="en-US" altLang="zh-CN" sz="1000" dirty="0"/>
-                <a:t>+1,</a:t>
-              </a:r>
-              <a:r>
-                <a:rPr lang="zh-CN" altLang="en-US" sz="1000" dirty="0"/>
-                <a:t>达到一定年龄后对象被存放到老年代</a:t>
-              </a:r>
-              <a:endParaRPr lang="en-US" altLang="zh-CN" sz="1000" dirty="0"/>
-            </a:p>
-            <a:p>
-              <a:endParaRPr lang="en-US" altLang="zh-CN" sz="1000" dirty="0"/>
-            </a:p>
-            <a:p>
-              <a:r>
-                <a:rPr lang="zh-CN" altLang="en-US" sz="1000" dirty="0"/>
-                <a:t>经过</a:t>
-              </a:r>
-              <a:r>
-                <a:rPr lang="en-US" altLang="zh-CN" sz="1000" dirty="0"/>
-                <a:t>N</a:t>
-              </a:r>
-              <a:r>
-                <a:rPr lang="zh-CN" altLang="en-US" sz="1000" dirty="0"/>
-                <a:t>次</a:t>
-              </a:r>
-              <a:r>
-                <a:rPr lang="en-US" altLang="zh-CN" sz="1000" dirty="0"/>
-                <a:t>GC</a:t>
-              </a:r>
-              <a:r>
-                <a:rPr lang="zh-CN" altLang="en-US" sz="1000" dirty="0"/>
-                <a:t>后比较稳定的</a:t>
-              </a:r>
-              <a:endParaRPr lang="en-US" altLang="zh-CN" sz="1000" dirty="0"/>
-            </a:p>
-            <a:p>
-              <a:r>
-                <a:rPr lang="zh-CN" altLang="en-US" sz="1000" dirty="0"/>
-                <a:t>对象实例存放在老年代</a:t>
-              </a:r>
-            </a:p>
-          </p:txBody>
-        </p:sp>
-        <p:cxnSp>
-          <p:nvCxnSpPr>
-            <p:cNvPr id="80" name="连接符: 肘形 79">
-              <a:extLst>
-                <a:ext uri="{FF2B5EF4-FFF2-40B4-BE49-F238E27FC236}">
-                  <a16:creationId xmlns:a16="http://schemas.microsoft.com/office/drawing/2014/main" id="{4F16B0A7-4D68-47F0-BFD1-59438474A488}"/>
-                </a:ext>
-              </a:extLst>
-            </p:cNvPr>
-            <p:cNvCxnSpPr>
-              <a:cxnSpLocks/>
-              <a:stCxn id="72" idx="0"/>
-              <a:endCxn id="93" idx="3"/>
-            </p:cNvCxnSpPr>
-            <p:nvPr/>
-          </p:nvCxnSpPr>
-          <p:spPr>
-            <a:xfrm rot="16200000" flipV="1">
-              <a:off x="6034035" y="1855069"/>
-              <a:ext cx="234073" cy="1772151"/>
-            </a:xfrm>
-            <a:prstGeom prst="bentConnector2">
-              <a:avLst/>
-            </a:prstGeom>
-            <a:ln>
-              <a:tailEnd type="triangle"/>
-            </a:ln>
-          </p:spPr>
-          <p:style>
-            <a:lnRef idx="1">
-              <a:schemeClr val="accent1"/>
-            </a:lnRef>
-            <a:fillRef idx="0">
-              <a:schemeClr val="accent1"/>
-            </a:fillRef>
-            <a:effectRef idx="0">
-              <a:schemeClr val="accent1"/>
-            </a:effectRef>
-            <a:fontRef idx="minor">
-              <a:schemeClr val="tx1"/>
-            </a:fontRef>
-          </p:style>
-        </p:cxnSp>
-        <p:cxnSp>
-          <p:nvCxnSpPr>
-            <p:cNvPr id="83" name="连接符: 肘形 82">
-              <a:extLst>
-                <a:ext uri="{FF2B5EF4-FFF2-40B4-BE49-F238E27FC236}">
-                  <a16:creationId xmlns:a16="http://schemas.microsoft.com/office/drawing/2014/main" id="{CBC69032-A714-4F12-A652-A5EBDF313068}"/>
-                </a:ext>
-              </a:extLst>
-            </p:cNvPr>
-            <p:cNvCxnSpPr>
-              <a:cxnSpLocks/>
-            </p:cNvCxnSpPr>
-            <p:nvPr/>
-          </p:nvCxnSpPr>
-          <p:spPr>
-            <a:xfrm rot="16200000" flipV="1">
-              <a:off x="6014208" y="1870755"/>
-              <a:ext cx="273726" cy="1772150"/>
-            </a:xfrm>
-            <a:prstGeom prst="bentConnector2">
-              <a:avLst/>
-            </a:prstGeom>
-            <a:ln>
-              <a:tailEnd type="triangle"/>
-            </a:ln>
-          </p:spPr>
-          <p:style>
-            <a:lnRef idx="1">
-              <a:schemeClr val="accent1"/>
-            </a:lnRef>
-            <a:fillRef idx="0">
-              <a:schemeClr val="accent1"/>
-            </a:fillRef>
-            <a:effectRef idx="0">
-              <a:schemeClr val="accent1"/>
-            </a:effectRef>
-            <a:fontRef idx="minor">
-              <a:schemeClr val="tx1"/>
-            </a:fontRef>
-          </p:style>
-        </p:cxnSp>
-        <p:pic>
-          <p:nvPicPr>
-            <p:cNvPr id="93" name="图片 92">
-              <a:extLst>
-                <a:ext uri="{FF2B5EF4-FFF2-40B4-BE49-F238E27FC236}">
-                  <a16:creationId xmlns:a16="http://schemas.microsoft.com/office/drawing/2014/main" id="{874C0BA4-21A4-4159-8A04-426D6AF5C7F1}"/>
-                </a:ext>
-              </a:extLst>
-            </p:cNvPr>
-            <p:cNvPicPr>
-              <a:picLocks noChangeAspect="1"/>
-            </p:cNvPicPr>
-            <p:nvPr/>
-          </p:nvPicPr>
-          <p:blipFill>
-            <a:blip r:embed="rId3">
-              <a:extLst>
-                <a:ext uri="{28A0092B-C50C-407E-A947-70E740481C1C}">
-                  <a14:useLocalDpi xmlns:a14="http://schemas.microsoft.com/office/drawing/2010/main" val="0"/>
-                </a:ext>
-              </a:extLst>
-            </a:blip>
-            <a:stretch>
-              <a:fillRect/>
-            </a:stretch>
-          </p:blipFill>
-          <p:spPr>
-            <a:xfrm>
-              <a:off x="4940205" y="2461713"/>
-              <a:ext cx="324790" cy="324790"/>
-            </a:xfrm>
-            <a:prstGeom prst="rect">
-              <a:avLst/>
-            </a:prstGeom>
-          </p:spPr>
-        </p:pic>
-        <p:sp>
-          <p:nvSpPr>
-            <p:cNvPr id="95" name="矩形 94">
-              <a:extLst>
-                <a:ext uri="{FF2B5EF4-FFF2-40B4-BE49-F238E27FC236}">
-                  <a16:creationId xmlns:a16="http://schemas.microsoft.com/office/drawing/2014/main" id="{17709567-6967-47C2-93EF-10516E52C4D6}"/>
-                </a:ext>
-              </a:extLst>
-            </p:cNvPr>
-            <p:cNvSpPr/>
-            <p:nvPr/>
-          </p:nvSpPr>
-          <p:spPr>
-            <a:xfrm>
-              <a:off x="2716536" y="6015213"/>
-              <a:ext cx="1822645" cy="323020"/>
-            </a:xfrm>
-            <a:prstGeom prst="rect">
-              <a:avLst/>
-            </a:prstGeom>
-          </p:spPr>
-          <p:style>
-            <a:lnRef idx="1">
-              <a:schemeClr val="dk1"/>
-            </a:lnRef>
-            <a:fillRef idx="2">
-              <a:schemeClr val="dk1"/>
-            </a:fillRef>
-            <a:effectRef idx="1">
-              <a:schemeClr val="dk1"/>
-            </a:effectRef>
-            <a:fontRef idx="minor">
-              <a:schemeClr val="dk1"/>
-            </a:fontRef>
-          </p:style>
-          <p:txBody>
-            <a:bodyPr rtlCol="0" anchor="ctr"/>
-            <a:lstStyle/>
-            <a:p>
-              <a:pPr algn="ctr"/>
-              <a:r>
-                <a:rPr lang="zh-CN" altLang="en-US" sz="1200" dirty="0"/>
-                <a:t>空闲指针区</a:t>
-              </a:r>
-            </a:p>
-          </p:txBody>
-        </p:sp>
-        <p:cxnSp>
-          <p:nvCxnSpPr>
-            <p:cNvPr id="97" name="连接符: 肘形 96">
-              <a:extLst>
-                <a:ext uri="{FF2B5EF4-FFF2-40B4-BE49-F238E27FC236}">
-                  <a16:creationId xmlns:a16="http://schemas.microsoft.com/office/drawing/2014/main" id="{4E675698-FBC8-4416-B5A3-F1A05B271049}"/>
-                </a:ext>
-              </a:extLst>
-            </p:cNvPr>
-            <p:cNvCxnSpPr>
-              <a:cxnSpLocks/>
-              <a:stCxn id="72" idx="4"/>
-              <a:endCxn id="95" idx="3"/>
-            </p:cNvCxnSpPr>
-            <p:nvPr/>
-          </p:nvCxnSpPr>
-          <p:spPr>
-            <a:xfrm rot="5400000">
-              <a:off x="4491974" y="3631551"/>
-              <a:ext cx="2592380" cy="2497965"/>
-            </a:xfrm>
-            <a:prstGeom prst="bentConnector2">
-              <a:avLst/>
-            </a:prstGeom>
-            <a:ln>
-              <a:tailEnd type="triangle"/>
-            </a:ln>
-          </p:spPr>
-          <p:style>
-            <a:lnRef idx="1">
-              <a:schemeClr val="accent1"/>
-            </a:lnRef>
-            <a:fillRef idx="0">
-              <a:schemeClr val="accent1"/>
-            </a:fillRef>
-            <a:effectRef idx="0">
-              <a:schemeClr val="accent1"/>
-            </a:effectRef>
-            <a:fontRef idx="minor">
-              <a:schemeClr val="tx1"/>
-            </a:fontRef>
-          </p:style>
-        </p:cxnSp>
-        <p:sp>
-          <p:nvSpPr>
-            <p:cNvPr id="98" name="文本框 97">
-              <a:extLst>
-                <a:ext uri="{FF2B5EF4-FFF2-40B4-BE49-F238E27FC236}">
-                  <a16:creationId xmlns:a16="http://schemas.microsoft.com/office/drawing/2014/main" id="{05902906-36FD-41F3-923E-C81A72133851}"/>
-                </a:ext>
-              </a:extLst>
-            </p:cNvPr>
-            <p:cNvSpPr txBox="1"/>
-            <p:nvPr/>
-          </p:nvSpPr>
-          <p:spPr>
-            <a:xfrm>
-              <a:off x="4704787" y="5268690"/>
-              <a:ext cx="2266967" cy="1169551"/>
-            </a:xfrm>
-            <a:prstGeom prst="rect">
-              <a:avLst/>
-            </a:prstGeom>
-            <a:noFill/>
-          </p:spPr>
-          <p:txBody>
-            <a:bodyPr wrap="square" rtlCol="0">
-              <a:spAutoFit/>
-            </a:bodyPr>
-            <a:lstStyle/>
-            <a:p>
-              <a:r>
-                <a:rPr lang="zh-CN" altLang="en-US" sz="1000" b="1" dirty="0"/>
-                <a:t>标记</a:t>
-              </a:r>
-              <a:r>
-                <a:rPr lang="en-US" altLang="zh-CN" sz="1000" b="1" dirty="0"/>
-                <a:t>-</a:t>
-              </a:r>
-              <a:r>
-                <a:rPr lang="zh-CN" altLang="en-US" sz="1000" b="1" dirty="0"/>
-                <a:t>整理算法</a:t>
-              </a:r>
-              <a:r>
-                <a:rPr lang="en-US" altLang="zh-CN" sz="1000" b="1" dirty="0"/>
-                <a:t>(Mark-compact)</a:t>
-              </a:r>
-            </a:p>
-            <a:p>
-              <a:r>
-                <a:rPr lang="en-US" altLang="zh-CN" sz="1000" dirty="0"/>
-                <a:t>GC</a:t>
-              </a:r>
-              <a:r>
-                <a:rPr lang="zh-CN" altLang="en-US" sz="1000" dirty="0"/>
-                <a:t>在回收老年代内存区域时将空闲指针对象统一移动到一块内存区域中（通常是最后端），然后将这段区域整体回收。</a:t>
-              </a:r>
-              <a:endParaRPr lang="en-US" altLang="zh-CN" sz="1000" dirty="0"/>
-            </a:p>
-            <a:p>
-              <a:endParaRPr lang="en-US" altLang="zh-CN" sz="1000" dirty="0"/>
-            </a:p>
-            <a:p>
-              <a:r>
-                <a:rPr lang="zh-CN" altLang="en-US" sz="1000" dirty="0"/>
-                <a:t>解决了内存碎片问题</a:t>
-              </a:r>
-            </a:p>
-          </p:txBody>
-        </p:sp>
-        <p:cxnSp>
-          <p:nvCxnSpPr>
-            <p:cNvPr id="105" name="连接符: 肘形 104">
-              <a:extLst>
-                <a:ext uri="{FF2B5EF4-FFF2-40B4-BE49-F238E27FC236}">
-                  <a16:creationId xmlns:a16="http://schemas.microsoft.com/office/drawing/2014/main" id="{CD618C3A-CB0B-4746-9224-359AC528E232}"/>
-                </a:ext>
-              </a:extLst>
-            </p:cNvPr>
-            <p:cNvCxnSpPr>
-              <a:stCxn id="93" idx="1"/>
-              <a:endCxn id="10" idx="3"/>
-            </p:cNvCxnSpPr>
-            <p:nvPr/>
-          </p:nvCxnSpPr>
-          <p:spPr>
-            <a:xfrm rot="10800000">
-              <a:off x="4555617" y="2330258"/>
-              <a:ext cx="384588" cy="293851"/>
-            </a:xfrm>
-            <a:prstGeom prst="bentConnector3">
-              <a:avLst/>
-            </a:prstGeom>
-            <a:ln>
-              <a:tailEnd type="triangle"/>
-            </a:ln>
-          </p:spPr>
-          <p:style>
-            <a:lnRef idx="1">
-              <a:schemeClr val="accent1"/>
-            </a:lnRef>
-            <a:fillRef idx="0">
-              <a:schemeClr val="accent1"/>
-            </a:fillRef>
-            <a:effectRef idx="0">
-              <a:schemeClr val="accent1"/>
-            </a:effectRef>
-            <a:fontRef idx="minor">
-              <a:schemeClr val="tx1"/>
-            </a:fontRef>
-          </p:style>
-        </p:cxnSp>
-        <p:cxnSp>
-          <p:nvCxnSpPr>
-            <p:cNvPr id="107" name="连接符: 肘形 106">
-              <a:extLst>
-                <a:ext uri="{FF2B5EF4-FFF2-40B4-BE49-F238E27FC236}">
-                  <a16:creationId xmlns:a16="http://schemas.microsoft.com/office/drawing/2014/main" id="{0ABFDF08-5EC6-43B6-94A0-A08239568451}"/>
-                </a:ext>
-              </a:extLst>
-            </p:cNvPr>
-            <p:cNvCxnSpPr>
-              <a:stCxn id="93" idx="1"/>
-              <a:endCxn id="11" idx="3"/>
-            </p:cNvCxnSpPr>
-            <p:nvPr/>
-          </p:nvCxnSpPr>
-          <p:spPr>
-            <a:xfrm rot="10800000" flipV="1">
-              <a:off x="4555617" y="2624108"/>
-              <a:ext cx="384588" cy="287826"/>
-            </a:xfrm>
-            <a:prstGeom prst="bentConnector3">
-              <a:avLst/>
-            </a:prstGeom>
-            <a:ln>
-              <a:tailEnd type="triangle"/>
-            </a:ln>
-          </p:spPr>
-          <p:style>
-            <a:lnRef idx="1">
-              <a:schemeClr val="accent1"/>
-            </a:lnRef>
-            <a:fillRef idx="0">
-              <a:schemeClr val="accent1"/>
-            </a:fillRef>
-            <a:effectRef idx="0">
-              <a:schemeClr val="accent1"/>
-            </a:effectRef>
-            <a:fontRef idx="minor">
-              <a:schemeClr val="tx1"/>
-            </a:fontRef>
-          </p:style>
-        </p:cxnSp>
-      </p:grpSp>
-      <p:cxnSp>
-        <p:nvCxnSpPr>
-          <p:cNvPr id="112" name="连接符: 肘形 111">
-            <a:extLst>
-              <a:ext uri="{FF2B5EF4-FFF2-40B4-BE49-F238E27FC236}">
-                <a16:creationId xmlns:a16="http://schemas.microsoft.com/office/drawing/2014/main" id="{8245DF43-FC0A-421B-97A6-F72FF1DE4F97}"/>
-              </a:ext>
-            </a:extLst>
-          </p:cNvPr>
-          <p:cNvCxnSpPr>
-            <a:cxnSpLocks/>
-            <a:stCxn id="72" idx="0"/>
-          </p:cNvCxnSpPr>
-          <p:nvPr/>
-        </p:nvCxnSpPr>
-        <p:spPr>
-          <a:xfrm rot="16200000" flipV="1">
-            <a:off x="6048142" y="1007531"/>
-            <a:ext cx="1085270" cy="2508475"/>
-          </a:xfrm>
-          <a:prstGeom prst="bentConnector2">
-            <a:avLst/>
-          </a:prstGeom>
-          <a:ln>
-            <a:tailEnd type="triangle"/>
-          </a:ln>
-        </p:spPr>
-        <p:style>
-          <a:lnRef idx="1">
-            <a:schemeClr val="accent1"/>
-          </a:lnRef>
-          <a:fillRef idx="0">
-            <a:schemeClr val="accent1"/>
-          </a:fillRef>
-          <a:effectRef idx="0">
-            <a:schemeClr val="accent1"/>
-          </a:effectRef>
-          <a:fontRef idx="minor">
-            <a:schemeClr val="tx1"/>
-          </a:fontRef>
-        </p:style>
-      </p:cxnSp>
-      <p:sp>
-        <p:nvSpPr>
-          <p:cNvPr id="118" name="文本框 117">
-            <a:extLst>
-              <a:ext uri="{FF2B5EF4-FFF2-40B4-BE49-F238E27FC236}">
-                <a16:creationId xmlns:a16="http://schemas.microsoft.com/office/drawing/2014/main" id="{41A169E0-95BD-4325-9CFB-06F60511D628}"/>
-              </a:ext>
-            </a:extLst>
-          </p:cNvPr>
-          <p:cNvSpPr txBox="1"/>
-          <p:nvPr/>
-        </p:nvSpPr>
-        <p:spPr>
-          <a:xfrm>
-            <a:off x="8149792" y="1692600"/>
-            <a:ext cx="1700542" cy="1477328"/>
-          </a:xfrm>
-          <a:prstGeom prst="rect">
-            <a:avLst/>
-          </a:prstGeom>
-          <a:noFill/>
-        </p:spPr>
-        <p:txBody>
-          <a:bodyPr wrap="square" rtlCol="0">
-            <a:spAutoFit/>
-          </a:bodyPr>
-          <a:lstStyle/>
-          <a:p>
-            <a:r>
-              <a:rPr lang="zh-CN" altLang="en-US" sz="1000" b="1" dirty="0"/>
-              <a:t>复制算法</a:t>
-            </a:r>
-            <a:r>
-              <a:rPr lang="en-US" altLang="zh-CN" sz="1000" b="1" dirty="0"/>
-              <a:t>(Copying)</a:t>
-            </a:r>
-          </a:p>
-          <a:p>
-            <a:r>
-              <a:rPr lang="zh-CN" altLang="en-US" sz="1000" dirty="0"/>
-              <a:t>回收</a:t>
-            </a:r>
-            <a:r>
-              <a:rPr lang="en-US" altLang="zh-CN" sz="1000" dirty="0" err="1"/>
-              <a:t>eden</a:t>
-            </a:r>
-            <a:r>
-              <a:rPr lang="zh-CN" altLang="en-US" sz="1000" dirty="0"/>
-              <a:t>区中对象时先将</a:t>
-            </a:r>
-            <a:r>
-              <a:rPr lang="en-US" altLang="zh-CN" sz="1000" dirty="0" err="1"/>
-              <a:t>enden</a:t>
-            </a:r>
-            <a:r>
-              <a:rPr lang="zh-CN" altLang="en-US" sz="1000" dirty="0"/>
-              <a:t>中存活的对象复制到</a:t>
-            </a:r>
-            <a:r>
-              <a:rPr lang="en-US" altLang="zh-CN" sz="1000" dirty="0"/>
-              <a:t>S0</a:t>
-            </a:r>
-            <a:r>
-              <a:rPr lang="zh-CN" altLang="en-US" sz="1000" dirty="0"/>
-              <a:t>中，然后清空</a:t>
-            </a:r>
-            <a:r>
-              <a:rPr lang="en-US" altLang="zh-CN" sz="1000" dirty="0" err="1"/>
-              <a:t>eden</a:t>
-            </a:r>
-            <a:r>
-              <a:rPr lang="zh-CN" altLang="en-US" sz="1000" dirty="0"/>
-              <a:t>区</a:t>
-            </a:r>
-            <a:endParaRPr lang="en-US" altLang="zh-CN" sz="1000" dirty="0"/>
-          </a:p>
-          <a:p>
-            <a:r>
-              <a:rPr lang="zh-CN" altLang="en-US" sz="1000" dirty="0"/>
-              <a:t>如果</a:t>
-            </a:r>
-            <a:r>
-              <a:rPr lang="en-US" altLang="zh-CN" sz="1000" dirty="0"/>
-              <a:t>S0</a:t>
-            </a:r>
-            <a:r>
-              <a:rPr lang="zh-CN" altLang="en-US" sz="1000" dirty="0"/>
-              <a:t>区已满，则将</a:t>
-            </a:r>
-            <a:r>
-              <a:rPr lang="en-US" altLang="zh-CN" sz="1000" dirty="0" err="1"/>
-              <a:t>eden</a:t>
-            </a:r>
-            <a:r>
-              <a:rPr lang="zh-CN" altLang="en-US" sz="1000" dirty="0"/>
-              <a:t>和</a:t>
-            </a:r>
-            <a:r>
-              <a:rPr lang="en-US" altLang="zh-CN" sz="1000" dirty="0"/>
-              <a:t>S0</a:t>
-            </a:r>
-            <a:r>
-              <a:rPr lang="zh-CN" altLang="en-US" sz="1000" dirty="0"/>
-              <a:t>中存活的对象复制到</a:t>
-            </a:r>
-            <a:r>
-              <a:rPr lang="en-US" altLang="zh-CN" sz="1000" dirty="0"/>
-              <a:t>S1,</a:t>
-            </a:r>
-            <a:r>
-              <a:rPr lang="zh-CN" altLang="en-US" sz="1000" dirty="0"/>
-              <a:t>然后清空</a:t>
-            </a:r>
-            <a:r>
-              <a:rPr lang="en-US" altLang="zh-CN" sz="1000" dirty="0" err="1"/>
-              <a:t>eden</a:t>
-            </a:r>
-            <a:r>
-              <a:rPr lang="zh-CN" altLang="en-US" sz="1000" dirty="0"/>
-              <a:t>和</a:t>
-            </a:r>
-            <a:r>
-              <a:rPr lang="en-US" altLang="zh-CN" sz="1000" dirty="0"/>
-              <a:t>S0,</a:t>
-            </a:r>
-          </a:p>
-          <a:p>
-            <a:r>
-              <a:rPr lang="zh-CN" altLang="en-US" sz="1000" dirty="0"/>
-              <a:t>最后将</a:t>
-            </a:r>
-            <a:r>
-              <a:rPr lang="en-US" altLang="zh-CN" sz="1000" dirty="0"/>
-              <a:t>S0</a:t>
-            </a:r>
-            <a:r>
-              <a:rPr lang="zh-CN" altLang="en-US" sz="1000" dirty="0"/>
-              <a:t>和</a:t>
-            </a:r>
-            <a:r>
-              <a:rPr lang="en-US" altLang="zh-CN" sz="1000" dirty="0"/>
-              <a:t>S1</a:t>
-            </a:r>
-            <a:r>
-              <a:rPr lang="zh-CN" altLang="en-US" sz="1000" dirty="0"/>
-              <a:t>互换</a:t>
-            </a:r>
-            <a:endParaRPr lang="en-US" altLang="zh-CN" sz="1000" dirty="0"/>
-          </a:p>
-          <a:p>
-            <a:r>
-              <a:rPr lang="zh-CN" altLang="en-US" sz="1000" dirty="0"/>
-              <a:t>保持</a:t>
-            </a:r>
-            <a:r>
-              <a:rPr lang="en-US" altLang="zh-CN" sz="1000" dirty="0"/>
-              <a:t>S1</a:t>
-            </a:r>
-            <a:r>
-              <a:rPr lang="zh-CN" altLang="en-US" sz="1000" dirty="0"/>
-              <a:t>为空</a:t>
             </a:r>
           </a:p>
         </p:txBody>
@@ -15745,153 +13751,2168 @@
           </a:p>
         </p:txBody>
       </p:sp>
-      <p:sp>
-        <p:nvSpPr>
-          <p:cNvPr id="47" name="矩形: 圆角 46">
+      <p:grpSp>
+        <p:nvGrpSpPr>
+          <p:cNvPr id="4" name="组合 3">
             <a:extLst>
               <a:ext uri="{FF2B5EF4-FFF2-40B4-BE49-F238E27FC236}">
-                <a16:creationId xmlns:a16="http://schemas.microsoft.com/office/drawing/2014/main" id="{16ED9D3C-DE15-4656-AC2A-E09AB601F82E}"/>
+                <a16:creationId xmlns:a16="http://schemas.microsoft.com/office/drawing/2014/main" id="{02D44929-2F19-46B3-8AA1-58534AE08318}"/>
               </a:ext>
             </a:extLst>
           </p:cNvPr>
-          <p:cNvSpPr/>
+          <p:cNvGrpSpPr/>
           <p:nvPr/>
-        </p:nvSpPr>
-        <p:spPr>
+        </p:nvGrpSpPr>
+        <p:grpSpPr>
           <a:xfrm>
-            <a:off x="10219157" y="3702187"/>
-            <a:ext cx="1560556" cy="323020"/>
+            <a:off x="2859983" y="473535"/>
+            <a:ext cx="9062730" cy="5910929"/>
+            <a:chOff x="2859983" y="473535"/>
+            <a:chExt cx="9062730" cy="5910929"/>
           </a:xfrm>
-          <a:prstGeom prst="roundRect">
-            <a:avLst/>
-          </a:prstGeom>
-        </p:spPr>
-        <p:style>
-          <a:lnRef idx="1">
-            <a:schemeClr val="accent6"/>
-          </a:lnRef>
-          <a:fillRef idx="3">
-            <a:schemeClr val="accent6"/>
-          </a:fillRef>
-          <a:effectRef idx="2">
-            <a:schemeClr val="accent6"/>
-          </a:effectRef>
-          <a:fontRef idx="minor">
-            <a:schemeClr val="lt1"/>
-          </a:fontRef>
-        </p:style>
-        <p:txBody>
-          <a:bodyPr rtlCol="0" anchor="ctr"/>
-          <a:lstStyle/>
-          <a:p>
-            <a:pPr algn="ctr"/>
-            <a:r>
-              <a:rPr lang="en-US" altLang="zh-CN" sz="1200" dirty="0"/>
-              <a:t>int  </a:t>
-            </a:r>
-            <a:r>
-              <a:rPr lang="en-US" altLang="zh-CN" sz="1200" dirty="0" err="1"/>
-              <a:t>i</a:t>
-            </a:r>
-            <a:r>
-              <a:rPr lang="en-US" altLang="zh-CN" sz="1200" dirty="0"/>
-              <a:t>=0;</a:t>
-            </a:r>
-          </a:p>
-        </p:txBody>
-      </p:sp>
-      <p:cxnSp>
-        <p:nvCxnSpPr>
-          <p:cNvPr id="14" name="连接符: 肘形 13">
-            <a:extLst>
-              <a:ext uri="{FF2B5EF4-FFF2-40B4-BE49-F238E27FC236}">
-                <a16:creationId xmlns:a16="http://schemas.microsoft.com/office/drawing/2014/main" id="{0505AA49-D079-4BC5-B7C1-A7DF3246E98A}"/>
-              </a:ext>
-            </a:extLst>
-          </p:cNvPr>
-          <p:cNvCxnSpPr>
-            <a:stCxn id="72" idx="5"/>
-            <a:endCxn id="47" idx="1"/>
-          </p:cNvCxnSpPr>
-          <p:nvPr/>
-        </p:nvCxnSpPr>
-        <p:spPr>
-          <a:xfrm rot="16200000" flipH="1">
-            <a:off x="8948321" y="2592860"/>
-            <a:ext cx="439475" cy="2102198"/>
-          </a:xfrm>
-          <a:prstGeom prst="bentConnector2">
-            <a:avLst/>
-          </a:prstGeom>
-          <a:ln>
-            <a:tailEnd type="triangle"/>
-          </a:ln>
-        </p:spPr>
-        <p:style>
-          <a:lnRef idx="1">
-            <a:schemeClr val="accent1"/>
-          </a:lnRef>
-          <a:fillRef idx="0">
-            <a:schemeClr val="accent1"/>
-          </a:fillRef>
-          <a:effectRef idx="0">
-            <a:schemeClr val="accent1"/>
-          </a:effectRef>
-          <a:fontRef idx="minor">
-            <a:schemeClr val="tx1"/>
-          </a:fontRef>
-        </p:style>
-      </p:cxnSp>
-      <p:sp>
-        <p:nvSpPr>
-          <p:cNvPr id="50" name="文本框 49">
-            <a:extLst>
-              <a:ext uri="{FF2B5EF4-FFF2-40B4-BE49-F238E27FC236}">
-                <a16:creationId xmlns:a16="http://schemas.microsoft.com/office/drawing/2014/main" id="{7E1325EB-C5EF-4331-BCAD-2EA27255A574}"/>
-              </a:ext>
-            </a:extLst>
-          </p:cNvPr>
-          <p:cNvSpPr txBox="1"/>
-          <p:nvPr/>
-        </p:nvSpPr>
-        <p:spPr>
-          <a:xfrm>
-            <a:off x="8187820" y="3893646"/>
-            <a:ext cx="1700542" cy="707886"/>
-          </a:xfrm>
-          <a:prstGeom prst="rect">
-            <a:avLst/>
-          </a:prstGeom>
-          <a:noFill/>
-        </p:spPr>
-        <p:txBody>
-          <a:bodyPr wrap="square" rtlCol="0">
-            <a:spAutoFit/>
-          </a:bodyPr>
-          <a:lstStyle/>
-          <a:p>
-            <a:r>
-              <a:rPr lang="zh-CN" altLang="en-US" sz="1000" b="1" dirty="0"/>
-              <a:t>栈中基础类型参数回收</a:t>
-            </a:r>
-            <a:endParaRPr lang="en-US" altLang="zh-CN" sz="1000" b="1" dirty="0"/>
-          </a:p>
-          <a:p>
-            <a:r>
-              <a:rPr lang="zh-CN" altLang="en-US" sz="1000" dirty="0"/>
-              <a:t>当方法调用完成后</a:t>
-            </a:r>
-            <a:r>
-              <a:rPr lang="en-US" altLang="zh-CN" sz="1000" dirty="0"/>
-              <a:t>GC</a:t>
-            </a:r>
-            <a:r>
-              <a:rPr lang="zh-CN" altLang="en-US" sz="1000" dirty="0"/>
-              <a:t>直接将栈中基础类型的参数进行回收</a:t>
-            </a:r>
-          </a:p>
-        </p:txBody>
-      </p:sp>
+        </p:grpSpPr>
+        <p:grpSp>
+          <p:nvGrpSpPr>
+            <p:cNvPr id="109" name="组合 108">
+              <a:extLst>
+                <a:ext uri="{FF2B5EF4-FFF2-40B4-BE49-F238E27FC236}">
+                  <a16:creationId xmlns:a16="http://schemas.microsoft.com/office/drawing/2014/main" id="{2C4FAE75-8F66-4314-B2CB-C1F241C376FE}"/>
+                </a:ext>
+              </a:extLst>
+            </p:cNvPr>
+            <p:cNvGrpSpPr/>
+            <p:nvPr/>
+          </p:nvGrpSpPr>
+          <p:grpSpPr>
+            <a:xfrm>
+              <a:off x="2859983" y="473535"/>
+              <a:ext cx="9062730" cy="5910929"/>
+              <a:chOff x="2052115" y="527312"/>
+              <a:chExt cx="9062730" cy="5910929"/>
+            </a:xfrm>
+          </p:grpSpPr>
+          <p:sp>
+            <p:nvSpPr>
+              <p:cNvPr id="9" name="矩形: 圆角 8">
+                <a:extLst>
+                  <a:ext uri="{FF2B5EF4-FFF2-40B4-BE49-F238E27FC236}">
+                    <a16:creationId xmlns:a16="http://schemas.microsoft.com/office/drawing/2014/main" id="{F1A4D849-5775-4D4A-BEBA-EC1B50AC3DAA}"/>
+                  </a:ext>
+                </a:extLst>
+              </p:cNvPr>
+              <p:cNvSpPr/>
+              <p:nvPr/>
+            </p:nvSpPr>
+            <p:spPr>
+              <a:xfrm>
+                <a:off x="6096000" y="888783"/>
+                <a:ext cx="1846555" cy="369332"/>
+              </a:xfrm>
+              <a:prstGeom prst="roundRect">
+                <a:avLst/>
+              </a:prstGeom>
+            </p:spPr>
+            <p:style>
+              <a:lnRef idx="2">
+                <a:schemeClr val="accent1"/>
+              </a:lnRef>
+              <a:fillRef idx="1">
+                <a:schemeClr val="lt1"/>
+              </a:fillRef>
+              <a:effectRef idx="0">
+                <a:schemeClr val="accent1"/>
+              </a:effectRef>
+              <a:fontRef idx="minor">
+                <a:schemeClr val="dk1"/>
+              </a:fontRef>
+            </p:style>
+            <p:txBody>
+              <a:bodyPr rtlCol="0" anchor="ctr"/>
+              <a:lstStyle/>
+              <a:p>
+                <a:pPr algn="ctr"/>
+                <a:r>
+                  <a:rPr lang="en-US" altLang="zh-CN" sz="1200" dirty="0"/>
+                  <a:t>User user1 =new User()</a:t>
+                </a:r>
+                <a:endParaRPr lang="zh-CN" altLang="en-US" sz="1200" dirty="0"/>
+              </a:p>
+            </p:txBody>
+          </p:sp>
+          <p:grpSp>
+            <p:nvGrpSpPr>
+              <p:cNvPr id="55" name="组合 54">
+                <a:extLst>
+                  <a:ext uri="{FF2B5EF4-FFF2-40B4-BE49-F238E27FC236}">
+                    <a16:creationId xmlns:a16="http://schemas.microsoft.com/office/drawing/2014/main" id="{32B515CD-3E4C-4F74-BF7C-7BB1C06C4116}"/>
+                  </a:ext>
+                </a:extLst>
+              </p:cNvPr>
+              <p:cNvGrpSpPr/>
+              <p:nvPr/>
+            </p:nvGrpSpPr>
+            <p:grpSpPr>
+              <a:xfrm>
+                <a:off x="2052115" y="527312"/>
+                <a:ext cx="2503502" cy="5811343"/>
+                <a:chOff x="2052115" y="527312"/>
+                <a:chExt cx="2503502" cy="5811343"/>
+              </a:xfrm>
+            </p:grpSpPr>
+            <p:grpSp>
+              <p:nvGrpSpPr>
+                <p:cNvPr id="13" name="组合 12">
+                  <a:extLst>
+                    <a:ext uri="{FF2B5EF4-FFF2-40B4-BE49-F238E27FC236}">
+                      <a16:creationId xmlns:a16="http://schemas.microsoft.com/office/drawing/2014/main" id="{888382EE-BEAE-4920-8713-F24C3579F315}"/>
+                    </a:ext>
+                  </a:extLst>
+                </p:cNvPr>
+                <p:cNvGrpSpPr/>
+                <p:nvPr/>
+              </p:nvGrpSpPr>
+              <p:grpSpPr>
+                <a:xfrm>
+                  <a:off x="2709062" y="888676"/>
+                  <a:ext cx="1846555" cy="5445309"/>
+                  <a:chOff x="2630078" y="2326734"/>
+                  <a:chExt cx="1036948" cy="3706421"/>
+                </a:xfrm>
+              </p:grpSpPr>
+              <p:sp>
+                <p:nvSpPr>
+                  <p:cNvPr id="8" name="矩形 7">
+                    <a:extLst>
+                      <a:ext uri="{FF2B5EF4-FFF2-40B4-BE49-F238E27FC236}">
+                        <a16:creationId xmlns:a16="http://schemas.microsoft.com/office/drawing/2014/main" id="{D5661055-821F-424E-B719-62EDD20A6DA1}"/>
+                      </a:ext>
+                    </a:extLst>
+                  </p:cNvPr>
+                  <p:cNvSpPr/>
+                  <p:nvPr/>
+                </p:nvSpPr>
+                <p:spPr>
+                  <a:xfrm>
+                    <a:off x="2630078" y="2326734"/>
+                    <a:ext cx="1036948" cy="791852"/>
+                  </a:xfrm>
+                  <a:prstGeom prst="rect">
+                    <a:avLst/>
+                  </a:prstGeom>
+                  <a:ln w="12700">
+                    <a:solidFill>
+                      <a:schemeClr val="tx1"/>
+                    </a:solidFill>
+                  </a:ln>
+                </p:spPr>
+                <p:style>
+                  <a:lnRef idx="1">
+                    <a:schemeClr val="accent2"/>
+                  </a:lnRef>
+                  <a:fillRef idx="3">
+                    <a:schemeClr val="accent2"/>
+                  </a:fillRef>
+                  <a:effectRef idx="2">
+                    <a:schemeClr val="accent2"/>
+                  </a:effectRef>
+                  <a:fontRef idx="minor">
+                    <a:schemeClr val="lt1"/>
+                  </a:fontRef>
+                </p:style>
+                <p:txBody>
+                  <a:bodyPr rtlCol="0" anchor="ctr"/>
+                  <a:lstStyle/>
+                  <a:p>
+                    <a:pPr algn="ctr"/>
+                    <a:endParaRPr lang="en-US" altLang="zh-CN" sz="1400" dirty="0"/>
+                  </a:p>
+                  <a:p>
+                    <a:pPr algn="ctr"/>
+                    <a:endParaRPr lang="en-US" altLang="zh-CN" sz="1400" dirty="0"/>
+                  </a:p>
+                </p:txBody>
+              </p:sp>
+              <p:sp>
+                <p:nvSpPr>
+                  <p:cNvPr id="10" name="矩形 9">
+                    <a:extLst>
+                      <a:ext uri="{FF2B5EF4-FFF2-40B4-BE49-F238E27FC236}">
+                        <a16:creationId xmlns:a16="http://schemas.microsoft.com/office/drawing/2014/main" id="{7529750C-B3A6-41E8-885A-E0DEFA34B2CF}"/>
+                      </a:ext>
+                    </a:extLst>
+                  </p:cNvPr>
+                  <p:cNvSpPr/>
+                  <p:nvPr/>
+                </p:nvSpPr>
+                <p:spPr>
+                  <a:xfrm>
+                    <a:off x="2630078" y="3118586"/>
+                    <a:ext cx="1036948" cy="378758"/>
+                  </a:xfrm>
+                  <a:prstGeom prst="rect">
+                    <a:avLst/>
+                  </a:prstGeom>
+                  <a:solidFill>
+                    <a:srgbClr val="C00000"/>
+                  </a:solidFill>
+                  <a:ln w="12700">
+                    <a:solidFill>
+                      <a:schemeClr val="tx1"/>
+                    </a:solidFill>
+                  </a:ln>
+                </p:spPr>
+                <p:style>
+                  <a:lnRef idx="2">
+                    <a:schemeClr val="accent1">
+                      <a:shade val="50000"/>
+                    </a:schemeClr>
+                  </a:lnRef>
+                  <a:fillRef idx="1">
+                    <a:schemeClr val="accent1"/>
+                  </a:fillRef>
+                  <a:effectRef idx="0">
+                    <a:schemeClr val="accent1"/>
+                  </a:effectRef>
+                  <a:fontRef idx="minor">
+                    <a:schemeClr val="lt1"/>
+                  </a:fontRef>
+                </p:style>
+                <p:txBody>
+                  <a:bodyPr rtlCol="0" anchor="ctr"/>
+                  <a:lstStyle/>
+                  <a:p>
+                    <a:pPr algn="ctr"/>
+                    <a:endParaRPr lang="en-US" altLang="zh-CN" sz="1200" dirty="0"/>
+                  </a:p>
+                  <a:p>
+                    <a:pPr algn="ctr"/>
+                    <a:r>
+                      <a:rPr lang="en-US" altLang="zh-CN" sz="1200" dirty="0"/>
+                      <a:t>S0</a:t>
+                    </a:r>
+                    <a:r>
+                      <a:rPr lang="zh-CN" altLang="en-US" sz="1200" dirty="0"/>
+                      <a:t>和</a:t>
+                    </a:r>
+                    <a:r>
+                      <a:rPr lang="en-US" altLang="zh-CN" sz="1200" dirty="0"/>
+                      <a:t>S1</a:t>
+                    </a:r>
+                    <a:r>
+                      <a:rPr lang="zh-CN" altLang="en-US" sz="1200" dirty="0"/>
+                      <a:t>是互换的</a:t>
+                    </a:r>
+                  </a:p>
+                </p:txBody>
+              </p:sp>
+              <p:sp>
+                <p:nvSpPr>
+                  <p:cNvPr id="11" name="矩形 10">
+                    <a:extLst>
+                      <a:ext uri="{FF2B5EF4-FFF2-40B4-BE49-F238E27FC236}">
+                        <a16:creationId xmlns:a16="http://schemas.microsoft.com/office/drawing/2014/main" id="{D32170FB-9966-47D0-A332-E41F3F938A13}"/>
+                      </a:ext>
+                    </a:extLst>
+                  </p:cNvPr>
+                  <p:cNvSpPr/>
+                  <p:nvPr/>
+                </p:nvSpPr>
+                <p:spPr>
+                  <a:xfrm>
+                    <a:off x="2630078" y="3497344"/>
+                    <a:ext cx="1036948" cy="413094"/>
+                  </a:xfrm>
+                  <a:prstGeom prst="rect">
+                    <a:avLst/>
+                  </a:prstGeom>
+                  <a:solidFill>
+                    <a:srgbClr val="C00000"/>
+                  </a:solidFill>
+                  <a:ln w="12700">
+                    <a:solidFill>
+                      <a:schemeClr val="tx1"/>
+                    </a:solidFill>
+                  </a:ln>
+                </p:spPr>
+                <p:style>
+                  <a:lnRef idx="2">
+                    <a:schemeClr val="accent1">
+                      <a:shade val="50000"/>
+                    </a:schemeClr>
+                  </a:lnRef>
+                  <a:fillRef idx="1">
+                    <a:schemeClr val="accent1"/>
+                  </a:fillRef>
+                  <a:effectRef idx="0">
+                    <a:schemeClr val="accent1"/>
+                  </a:effectRef>
+                  <a:fontRef idx="minor">
+                    <a:schemeClr val="lt1"/>
+                  </a:fontRef>
+                </p:style>
+                <p:txBody>
+                  <a:bodyPr rtlCol="0" anchor="ctr"/>
+                  <a:lstStyle/>
+                  <a:p>
+                    <a:pPr algn="ctr"/>
+                    <a:r>
+                      <a:rPr lang="en-US" altLang="zh-CN" sz="1200" dirty="0"/>
+                      <a:t>S1</a:t>
+                    </a:r>
+                    <a:r>
+                      <a:rPr lang="zh-CN" altLang="en-US" sz="1200" dirty="0"/>
+                      <a:t>始终为空</a:t>
+                    </a:r>
+                  </a:p>
+                </p:txBody>
+              </p:sp>
+              <p:sp>
+                <p:nvSpPr>
+                  <p:cNvPr id="12" name="矩形 11">
+                    <a:extLst>
+                      <a:ext uri="{FF2B5EF4-FFF2-40B4-BE49-F238E27FC236}">
+                        <a16:creationId xmlns:a16="http://schemas.microsoft.com/office/drawing/2014/main" id="{C039B9DC-197A-4256-90CC-519800C2F01B}"/>
+                      </a:ext>
+                    </a:extLst>
+                  </p:cNvPr>
+                  <p:cNvSpPr/>
+                  <p:nvPr/>
+                </p:nvSpPr>
+                <p:spPr>
+                  <a:xfrm>
+                    <a:off x="2630078" y="3910437"/>
+                    <a:ext cx="1036948" cy="2122718"/>
+                  </a:xfrm>
+                  <a:prstGeom prst="rect">
+                    <a:avLst/>
+                  </a:prstGeom>
+                  <a:ln w="12700">
+                    <a:solidFill>
+                      <a:schemeClr val="tx1"/>
+                    </a:solidFill>
+                  </a:ln>
+                </p:spPr>
+                <p:style>
+                  <a:lnRef idx="1">
+                    <a:schemeClr val="accent3"/>
+                  </a:lnRef>
+                  <a:fillRef idx="3">
+                    <a:schemeClr val="accent3"/>
+                  </a:fillRef>
+                  <a:effectRef idx="2">
+                    <a:schemeClr val="accent3"/>
+                  </a:effectRef>
+                  <a:fontRef idx="minor">
+                    <a:schemeClr val="lt1"/>
+                  </a:fontRef>
+                </p:style>
+                <p:txBody>
+                  <a:bodyPr rtlCol="0" anchor="ctr"/>
+                  <a:lstStyle/>
+                  <a:p>
+                    <a:pPr algn="ctr"/>
+                    <a:endParaRPr lang="zh-CN" altLang="en-US" sz="1400" dirty="0"/>
+                  </a:p>
+                </p:txBody>
+              </p:sp>
+            </p:grpSp>
+            <p:sp>
+              <p:nvSpPr>
+                <p:cNvPr id="2" name="左大括号 1">
+                  <a:extLst>
+                    <a:ext uri="{FF2B5EF4-FFF2-40B4-BE49-F238E27FC236}">
+                      <a16:creationId xmlns:a16="http://schemas.microsoft.com/office/drawing/2014/main" id="{B15135C3-5C35-4D2A-9A64-F2B2BD4D9AA7}"/>
+                    </a:ext>
+                  </a:extLst>
+                </p:cNvPr>
+                <p:cNvSpPr/>
+                <p:nvPr/>
+              </p:nvSpPr>
+              <p:spPr>
+                <a:xfrm>
+                  <a:off x="2414726" y="893347"/>
+                  <a:ext cx="294336" cy="2326705"/>
+                </a:xfrm>
+                <a:prstGeom prst="leftBrace">
+                  <a:avLst/>
+                </a:prstGeom>
+              </p:spPr>
+              <p:style>
+                <a:lnRef idx="1">
+                  <a:schemeClr val="accent1"/>
+                </a:lnRef>
+                <a:fillRef idx="0">
+                  <a:schemeClr val="accent1"/>
+                </a:fillRef>
+                <a:effectRef idx="0">
+                  <a:schemeClr val="accent1"/>
+                </a:effectRef>
+                <a:fontRef idx="minor">
+                  <a:schemeClr val="tx1"/>
+                </a:fontRef>
+              </p:style>
+              <p:txBody>
+                <a:bodyPr rtlCol="0" anchor="ctr"/>
+                <a:lstStyle/>
+                <a:p>
+                  <a:pPr algn="ctr"/>
+                  <a:endParaRPr lang="zh-CN" altLang="en-US" dirty="0"/>
+                </a:p>
+              </p:txBody>
+            </p:sp>
+            <p:sp>
+              <p:nvSpPr>
+                <p:cNvPr id="32" name="左大括号 31">
+                  <a:extLst>
+                    <a:ext uri="{FF2B5EF4-FFF2-40B4-BE49-F238E27FC236}">
+                      <a16:creationId xmlns:a16="http://schemas.microsoft.com/office/drawing/2014/main" id="{CE362E93-6033-4DCC-9C6D-112514013B40}"/>
+                    </a:ext>
+                  </a:extLst>
+                </p:cNvPr>
+                <p:cNvSpPr/>
+                <p:nvPr/>
+              </p:nvSpPr>
+              <p:spPr>
+                <a:xfrm>
+                  <a:off x="2414726" y="3220052"/>
+                  <a:ext cx="294336" cy="3118603"/>
+                </a:xfrm>
+                <a:prstGeom prst="leftBrace">
+                  <a:avLst/>
+                </a:prstGeom>
+              </p:spPr>
+              <p:style>
+                <a:lnRef idx="1">
+                  <a:schemeClr val="accent1"/>
+                </a:lnRef>
+                <a:fillRef idx="0">
+                  <a:schemeClr val="accent1"/>
+                </a:fillRef>
+                <a:effectRef idx="0">
+                  <a:schemeClr val="accent1"/>
+                </a:effectRef>
+                <a:fontRef idx="minor">
+                  <a:schemeClr val="tx1"/>
+                </a:fontRef>
+              </p:style>
+              <p:txBody>
+                <a:bodyPr rtlCol="0" anchor="ctr"/>
+                <a:lstStyle/>
+                <a:p>
+                  <a:pPr algn="ctr"/>
+                  <a:endParaRPr lang="zh-CN" altLang="en-US"/>
+                </a:p>
+              </p:txBody>
+            </p:sp>
+            <p:sp>
+              <p:nvSpPr>
+                <p:cNvPr id="3" name="文本框 2">
+                  <a:extLst>
+                    <a:ext uri="{FF2B5EF4-FFF2-40B4-BE49-F238E27FC236}">
+                      <a16:creationId xmlns:a16="http://schemas.microsoft.com/office/drawing/2014/main" id="{86EDA522-321C-49CE-B97E-4C876FB3E837}"/>
+                    </a:ext>
+                  </a:extLst>
+                </p:cNvPr>
+                <p:cNvSpPr txBox="1"/>
+                <p:nvPr/>
+              </p:nvSpPr>
+              <p:spPr>
+                <a:xfrm>
+                  <a:off x="2052115" y="1696287"/>
+                  <a:ext cx="430887" cy="707886"/>
+                </a:xfrm>
+                <a:prstGeom prst="rect">
+                  <a:avLst/>
+                </a:prstGeom>
+                <a:noFill/>
+              </p:spPr>
+              <p:txBody>
+                <a:bodyPr vert="eaVert" wrap="none" rtlCol="0">
+                  <a:spAutoFit/>
+                </a:bodyPr>
+                <a:lstStyle/>
+                <a:p>
+                  <a:r>
+                    <a:rPr lang="zh-CN" altLang="en-US" sz="1600" dirty="0"/>
+                    <a:t>新生代</a:t>
+                  </a:r>
+                </a:p>
+              </p:txBody>
+            </p:sp>
+            <p:sp>
+              <p:nvSpPr>
+                <p:cNvPr id="34" name="文本框 33">
+                  <a:extLst>
+                    <a:ext uri="{FF2B5EF4-FFF2-40B4-BE49-F238E27FC236}">
+                      <a16:creationId xmlns:a16="http://schemas.microsoft.com/office/drawing/2014/main" id="{46456A63-AF68-49C3-8F55-502BE4B65113}"/>
+                    </a:ext>
+                  </a:extLst>
+                </p:cNvPr>
+                <p:cNvSpPr txBox="1"/>
+                <p:nvPr/>
+              </p:nvSpPr>
+              <p:spPr>
+                <a:xfrm>
+                  <a:off x="2055678" y="4423075"/>
+                  <a:ext cx="430887" cy="707886"/>
+                </a:xfrm>
+                <a:prstGeom prst="rect">
+                  <a:avLst/>
+                </a:prstGeom>
+                <a:noFill/>
+              </p:spPr>
+              <p:txBody>
+                <a:bodyPr vert="eaVert" wrap="none" rtlCol="0">
+                  <a:spAutoFit/>
+                </a:bodyPr>
+                <a:lstStyle/>
+                <a:p>
+                  <a:r>
+                    <a:rPr lang="zh-CN" altLang="en-US" sz="1600" dirty="0"/>
+                    <a:t>老年代</a:t>
+                  </a:r>
+                </a:p>
+              </p:txBody>
+            </p:sp>
+            <p:sp>
+              <p:nvSpPr>
+                <p:cNvPr id="7" name="文本框 6">
+                  <a:extLst>
+                    <a:ext uri="{FF2B5EF4-FFF2-40B4-BE49-F238E27FC236}">
+                      <a16:creationId xmlns:a16="http://schemas.microsoft.com/office/drawing/2014/main" id="{7F5DE130-74F4-425D-9D76-E5396B406BA5}"/>
+                    </a:ext>
+                  </a:extLst>
+                </p:cNvPr>
+                <p:cNvSpPr txBox="1"/>
+                <p:nvPr/>
+              </p:nvSpPr>
+              <p:spPr>
+                <a:xfrm>
+                  <a:off x="3412588" y="527312"/>
+                  <a:ext cx="415498" cy="369332"/>
+                </a:xfrm>
+                <a:prstGeom prst="rect">
+                  <a:avLst/>
+                </a:prstGeom>
+                <a:noFill/>
+              </p:spPr>
+              <p:txBody>
+                <a:bodyPr wrap="none" rtlCol="0">
+                  <a:spAutoFit/>
+                </a:bodyPr>
+                <a:lstStyle/>
+                <a:p>
+                  <a:r>
+                    <a:rPr lang="zh-CN" altLang="en-US" dirty="0"/>
+                    <a:t>堆</a:t>
+                  </a:r>
+                </a:p>
+              </p:txBody>
+            </p:sp>
+            <p:sp>
+              <p:nvSpPr>
+                <p:cNvPr id="17" name="矩形: 圆角 16">
+                  <a:extLst>
+                    <a:ext uri="{FF2B5EF4-FFF2-40B4-BE49-F238E27FC236}">
+                      <a16:creationId xmlns:a16="http://schemas.microsoft.com/office/drawing/2014/main" id="{FEDA6B9D-468F-407A-8E7F-706D4305C443}"/>
+                    </a:ext>
+                  </a:extLst>
+                </p:cNvPr>
+                <p:cNvSpPr/>
+                <p:nvPr/>
+              </p:nvSpPr>
+              <p:spPr>
+                <a:xfrm>
+                  <a:off x="2840059" y="1375404"/>
+                  <a:ext cx="1560556" cy="323020"/>
+                </a:xfrm>
+                <a:prstGeom prst="roundRect">
+                  <a:avLst/>
+                </a:prstGeom>
+              </p:spPr>
+              <p:style>
+                <a:lnRef idx="1">
+                  <a:schemeClr val="accent6"/>
+                </a:lnRef>
+                <a:fillRef idx="3">
+                  <a:schemeClr val="accent6"/>
+                </a:fillRef>
+                <a:effectRef idx="2">
+                  <a:schemeClr val="accent6"/>
+                </a:effectRef>
+                <a:fontRef idx="minor">
+                  <a:schemeClr val="lt1"/>
+                </a:fontRef>
+              </p:style>
+              <p:txBody>
+                <a:bodyPr rtlCol="0" anchor="ctr"/>
+                <a:lstStyle/>
+                <a:p>
+                  <a:pPr algn="ctr"/>
+                  <a:r>
+                    <a:rPr lang="en-US" altLang="zh-CN" sz="1200" dirty="0"/>
+                    <a:t>User {name=</a:t>
+                  </a:r>
+                  <a:r>
+                    <a:rPr lang="zh-CN" altLang="en-US" sz="1200" dirty="0"/>
+                    <a:t>‘张三’</a:t>
+                  </a:r>
+                  <a:r>
+                    <a:rPr lang="en-US" altLang="zh-CN" sz="1200" dirty="0"/>
+                    <a:t>}</a:t>
+                  </a:r>
+                </a:p>
+              </p:txBody>
+            </p:sp>
+          </p:grpSp>
+          <p:cxnSp>
+            <p:nvCxnSpPr>
+              <p:cNvPr id="26" name="连接符: 肘形 25">
+                <a:extLst>
+                  <a:ext uri="{FF2B5EF4-FFF2-40B4-BE49-F238E27FC236}">
+                    <a16:creationId xmlns:a16="http://schemas.microsoft.com/office/drawing/2014/main" id="{9C2058C2-63B6-4425-B3A8-6522FAB2A16F}"/>
+                  </a:ext>
+                </a:extLst>
+              </p:cNvPr>
+              <p:cNvCxnSpPr>
+                <a:cxnSpLocks/>
+                <a:stCxn id="9" idx="1"/>
+                <a:endCxn id="17" idx="0"/>
+              </p:cNvCxnSpPr>
+              <p:nvPr/>
+            </p:nvCxnSpPr>
+            <p:spPr>
+              <a:xfrm rot="10800000" flipV="1">
+                <a:off x="3620338" y="1073448"/>
+                <a:ext cx="2475663" cy="301955"/>
+              </a:xfrm>
+              <a:prstGeom prst="bentConnector2">
+                <a:avLst/>
+              </a:prstGeom>
+              <a:ln>
+                <a:tailEnd type="triangle"/>
+              </a:ln>
+            </p:spPr>
+            <p:style>
+              <a:lnRef idx="1">
+                <a:schemeClr val="accent1"/>
+              </a:lnRef>
+              <a:fillRef idx="0">
+                <a:schemeClr val="accent1"/>
+              </a:fillRef>
+              <a:effectRef idx="0">
+                <a:schemeClr val="accent1"/>
+              </a:effectRef>
+              <a:fontRef idx="minor">
+                <a:schemeClr val="tx1"/>
+              </a:fontRef>
+            </p:style>
+          </p:cxnSp>
+          <p:grpSp>
+            <p:nvGrpSpPr>
+              <p:cNvPr id="56" name="组合 55">
+                <a:extLst>
+                  <a:ext uri="{FF2B5EF4-FFF2-40B4-BE49-F238E27FC236}">
+                    <a16:creationId xmlns:a16="http://schemas.microsoft.com/office/drawing/2014/main" id="{B08ED032-CD5A-4D81-834A-A3455C4C0B0E}"/>
+                  </a:ext>
+                </a:extLst>
+              </p:cNvPr>
+              <p:cNvGrpSpPr/>
+              <p:nvPr/>
+            </p:nvGrpSpPr>
+            <p:grpSpPr>
+              <a:xfrm>
+                <a:off x="9268290" y="536140"/>
+                <a:ext cx="1846555" cy="5802515"/>
+                <a:chOff x="9268290" y="536140"/>
+                <a:chExt cx="1846555" cy="5802515"/>
+              </a:xfrm>
+            </p:grpSpPr>
+            <p:sp>
+              <p:nvSpPr>
+                <p:cNvPr id="5" name="矩形 4">
+                  <a:extLst>
+                    <a:ext uri="{FF2B5EF4-FFF2-40B4-BE49-F238E27FC236}">
+                      <a16:creationId xmlns:a16="http://schemas.microsoft.com/office/drawing/2014/main" id="{585D7B2D-5A8C-45B6-8532-9D8D57FD9A26}"/>
+                    </a:ext>
+                  </a:extLst>
+                </p:cNvPr>
+                <p:cNvSpPr/>
+                <p:nvPr/>
+              </p:nvSpPr>
+              <p:spPr>
+                <a:xfrm>
+                  <a:off x="9268290" y="893347"/>
+                  <a:ext cx="1846555" cy="5445308"/>
+                </a:xfrm>
+                <a:prstGeom prst="rect">
+                  <a:avLst/>
+                </a:prstGeom>
+                <a:solidFill>
+                  <a:schemeClr val="accent6">
+                    <a:lumMod val="40000"/>
+                    <a:lumOff val="60000"/>
+                  </a:schemeClr>
+                </a:solidFill>
+              </p:spPr>
+              <p:style>
+                <a:lnRef idx="2">
+                  <a:schemeClr val="accent1">
+                    <a:shade val="50000"/>
+                  </a:schemeClr>
+                </a:lnRef>
+                <a:fillRef idx="1">
+                  <a:schemeClr val="accent1"/>
+                </a:fillRef>
+                <a:effectRef idx="0">
+                  <a:schemeClr val="accent1"/>
+                </a:effectRef>
+                <a:fontRef idx="minor">
+                  <a:schemeClr val="lt1"/>
+                </a:fontRef>
+              </p:style>
+              <p:txBody>
+                <a:bodyPr rtlCol="0" anchor="ctr"/>
+                <a:lstStyle/>
+                <a:p>
+                  <a:pPr algn="ctr"/>
+                  <a:endParaRPr lang="zh-CN" altLang="en-US"/>
+                </a:p>
+              </p:txBody>
+            </p:sp>
+            <p:sp>
+              <p:nvSpPr>
+                <p:cNvPr id="38" name="文本框 37">
+                  <a:extLst>
+                    <a:ext uri="{FF2B5EF4-FFF2-40B4-BE49-F238E27FC236}">
+                      <a16:creationId xmlns:a16="http://schemas.microsoft.com/office/drawing/2014/main" id="{1D076E1C-6617-4723-9007-110BD9E91620}"/>
+                    </a:ext>
+                  </a:extLst>
+                </p:cNvPr>
+                <p:cNvSpPr txBox="1"/>
+                <p:nvPr/>
+              </p:nvSpPr>
+              <p:spPr>
+                <a:xfrm>
+                  <a:off x="9983818" y="536140"/>
+                  <a:ext cx="415498" cy="369332"/>
+                </a:xfrm>
+                <a:prstGeom prst="rect">
+                  <a:avLst/>
+                </a:prstGeom>
+                <a:noFill/>
+              </p:spPr>
+              <p:txBody>
+                <a:bodyPr wrap="none" rtlCol="0">
+                  <a:spAutoFit/>
+                </a:bodyPr>
+                <a:lstStyle/>
+                <a:p>
+                  <a:r>
+                    <a:rPr lang="zh-CN" altLang="en-US" dirty="0"/>
+                    <a:t>栈</a:t>
+                  </a:r>
+                </a:p>
+              </p:txBody>
+            </p:sp>
+            <p:sp>
+              <p:nvSpPr>
+                <p:cNvPr id="45" name="矩形: 圆角 44">
+                  <a:extLst>
+                    <a:ext uri="{FF2B5EF4-FFF2-40B4-BE49-F238E27FC236}">
+                      <a16:creationId xmlns:a16="http://schemas.microsoft.com/office/drawing/2014/main" id="{9824E838-E8CC-4800-8EF5-C7B632343A70}"/>
+                    </a:ext>
+                  </a:extLst>
+                </p:cNvPr>
+                <p:cNvSpPr/>
+                <p:nvPr/>
+              </p:nvSpPr>
+              <p:spPr>
+                <a:xfrm>
+                  <a:off x="9448534" y="1375404"/>
+                  <a:ext cx="1560556" cy="323020"/>
+                </a:xfrm>
+                <a:prstGeom prst="roundRect">
+                  <a:avLst/>
+                </a:prstGeom>
+              </p:spPr>
+              <p:style>
+                <a:lnRef idx="1">
+                  <a:schemeClr val="accent6"/>
+                </a:lnRef>
+                <a:fillRef idx="3">
+                  <a:schemeClr val="accent6"/>
+                </a:fillRef>
+                <a:effectRef idx="2">
+                  <a:schemeClr val="accent6"/>
+                </a:effectRef>
+                <a:fontRef idx="minor">
+                  <a:schemeClr val="lt1"/>
+                </a:fontRef>
+              </p:style>
+              <p:txBody>
+                <a:bodyPr rtlCol="0" anchor="ctr"/>
+                <a:lstStyle/>
+                <a:p>
+                  <a:pPr algn="ctr"/>
+                  <a:r>
+                    <a:rPr lang="en-US" altLang="zh-CN" sz="1200" dirty="0"/>
+                    <a:t>user1</a:t>
+                  </a:r>
+                </a:p>
+              </p:txBody>
+            </p:sp>
+          </p:grpSp>
+          <p:cxnSp>
+            <p:nvCxnSpPr>
+              <p:cNvPr id="43" name="连接符: 肘形 42">
+                <a:extLst>
+                  <a:ext uri="{FF2B5EF4-FFF2-40B4-BE49-F238E27FC236}">
+                    <a16:creationId xmlns:a16="http://schemas.microsoft.com/office/drawing/2014/main" id="{F8C4D271-0E44-4B07-A91A-05983A59BF8D}"/>
+                  </a:ext>
+                </a:extLst>
+              </p:cNvPr>
+              <p:cNvCxnSpPr>
+                <a:cxnSpLocks/>
+                <a:stCxn id="9" idx="3"/>
+                <a:endCxn id="45" idx="0"/>
+              </p:cNvCxnSpPr>
+              <p:nvPr/>
+            </p:nvCxnSpPr>
+            <p:spPr>
+              <a:xfrm>
+                <a:off x="7942555" y="1073449"/>
+                <a:ext cx="2286257" cy="301955"/>
+              </a:xfrm>
+              <a:prstGeom prst="bentConnector2">
+                <a:avLst/>
+              </a:prstGeom>
+              <a:ln>
+                <a:tailEnd type="triangle"/>
+              </a:ln>
+            </p:spPr>
+            <p:style>
+              <a:lnRef idx="1">
+                <a:schemeClr val="accent1"/>
+              </a:lnRef>
+              <a:fillRef idx="0">
+                <a:schemeClr val="accent1"/>
+              </a:fillRef>
+              <a:effectRef idx="0">
+                <a:schemeClr val="accent1"/>
+              </a:effectRef>
+              <a:fontRef idx="minor">
+                <a:schemeClr val="tx1"/>
+              </a:fontRef>
+            </p:style>
+          </p:cxnSp>
+          <p:cxnSp>
+            <p:nvCxnSpPr>
+              <p:cNvPr id="46" name="直接箭头连接符 45">
+                <a:extLst>
+                  <a:ext uri="{FF2B5EF4-FFF2-40B4-BE49-F238E27FC236}">
+                    <a16:creationId xmlns:a16="http://schemas.microsoft.com/office/drawing/2014/main" id="{1796C92D-6632-498B-B60A-E9983D587A9D}"/>
+                  </a:ext>
+                </a:extLst>
+              </p:cNvPr>
+              <p:cNvCxnSpPr>
+                <a:cxnSpLocks/>
+                <a:stCxn id="45" idx="1"/>
+                <a:endCxn id="17" idx="3"/>
+              </p:cNvCxnSpPr>
+              <p:nvPr/>
+            </p:nvCxnSpPr>
+            <p:spPr>
+              <a:xfrm flipH="1">
+                <a:off x="4400615" y="1536914"/>
+                <a:ext cx="5047919" cy="0"/>
+              </a:xfrm>
+              <a:prstGeom prst="straightConnector1">
+                <a:avLst/>
+              </a:prstGeom>
+              <a:ln>
+                <a:tailEnd type="triangle"/>
+              </a:ln>
+            </p:spPr>
+            <p:style>
+              <a:lnRef idx="1">
+                <a:schemeClr val="accent1"/>
+              </a:lnRef>
+              <a:fillRef idx="0">
+                <a:schemeClr val="accent1"/>
+              </a:fillRef>
+              <a:effectRef idx="0">
+                <a:schemeClr val="accent1"/>
+              </a:effectRef>
+              <a:fontRef idx="minor">
+                <a:schemeClr val="tx1"/>
+              </a:fontRef>
+            </p:style>
+          </p:cxnSp>
+          <p:sp>
+            <p:nvSpPr>
+              <p:cNvPr id="54" name="文本框 53">
+                <a:extLst>
+                  <a:ext uri="{FF2B5EF4-FFF2-40B4-BE49-F238E27FC236}">
+                    <a16:creationId xmlns:a16="http://schemas.microsoft.com/office/drawing/2014/main" id="{08634D36-AC53-4E01-9B29-5ADAB651CEC1}"/>
+                  </a:ext>
+                </a:extLst>
+              </p:cNvPr>
+              <p:cNvSpPr txBox="1"/>
+              <p:nvPr/>
+            </p:nvSpPr>
+            <p:spPr>
+              <a:xfrm>
+                <a:off x="6156778" y="1336859"/>
+                <a:ext cx="1510350" cy="400110"/>
+              </a:xfrm>
+              <a:prstGeom prst="rect">
+                <a:avLst/>
+              </a:prstGeom>
+              <a:noFill/>
+            </p:spPr>
+            <p:txBody>
+              <a:bodyPr wrap="none" rtlCol="0">
+                <a:spAutoFit/>
+              </a:bodyPr>
+              <a:lstStyle/>
+              <a:p>
+                <a:r>
+                  <a:rPr lang="zh-CN" altLang="en-US" sz="1000" dirty="0"/>
+                  <a:t>局部变量</a:t>
+                </a:r>
+                <a:r>
+                  <a:rPr lang="en-US" altLang="zh-CN" sz="1000" dirty="0"/>
+                  <a:t>user1</a:t>
+                </a:r>
+                <a:r>
+                  <a:rPr lang="zh-CN" altLang="en-US" sz="1000" dirty="0"/>
+                  <a:t>指针指向</a:t>
+                </a:r>
+                <a:endParaRPr lang="en-US" altLang="zh-CN" sz="1000" dirty="0"/>
+              </a:p>
+              <a:p>
+                <a:r>
+                  <a:rPr lang="zh-CN" altLang="en-US" sz="1000" dirty="0"/>
+                  <a:t>堆中对象的实例</a:t>
+                </a:r>
+              </a:p>
+            </p:txBody>
+          </p:sp>
+          <p:sp>
+            <p:nvSpPr>
+              <p:cNvPr id="61" name="文本框 60">
+                <a:extLst>
+                  <a:ext uri="{FF2B5EF4-FFF2-40B4-BE49-F238E27FC236}">
+                    <a16:creationId xmlns:a16="http://schemas.microsoft.com/office/drawing/2014/main" id="{D558D7F8-2A38-4F83-AF3C-ED3994D70856}"/>
+                  </a:ext>
+                </a:extLst>
+              </p:cNvPr>
+              <p:cNvSpPr txBox="1"/>
+              <p:nvPr/>
+            </p:nvSpPr>
+            <p:spPr>
+              <a:xfrm>
+                <a:off x="4597753" y="873391"/>
+                <a:ext cx="1484702" cy="400110"/>
+              </a:xfrm>
+              <a:prstGeom prst="rect">
+                <a:avLst/>
+              </a:prstGeom>
+              <a:noFill/>
+            </p:spPr>
+            <p:txBody>
+              <a:bodyPr wrap="none" rtlCol="0">
+                <a:spAutoFit/>
+              </a:bodyPr>
+              <a:lstStyle/>
+              <a:p>
+                <a:r>
+                  <a:rPr lang="zh-CN" altLang="en-US" sz="1000" dirty="0"/>
+                  <a:t>新</a:t>
+                </a:r>
+                <a:r>
+                  <a:rPr lang="en-US" altLang="zh-CN" sz="1000" dirty="0"/>
+                  <a:t>new</a:t>
+                </a:r>
+                <a:r>
+                  <a:rPr lang="zh-CN" altLang="en-US" sz="1000" dirty="0"/>
+                  <a:t>的对象实例数据</a:t>
+                </a:r>
+                <a:endParaRPr lang="en-US" altLang="zh-CN" sz="1000" dirty="0"/>
+              </a:p>
+              <a:p>
+                <a:r>
+                  <a:rPr lang="zh-CN" altLang="en-US" sz="1000" dirty="0"/>
+                  <a:t>存放在堆中的</a:t>
+                </a:r>
+                <a:r>
+                  <a:rPr lang="en-US" altLang="zh-CN" sz="1000" dirty="0"/>
+                  <a:t>Eden</a:t>
+                </a:r>
+                <a:r>
+                  <a:rPr lang="zh-CN" altLang="en-US" sz="1000" dirty="0"/>
+                  <a:t>区域</a:t>
+                </a:r>
+              </a:p>
+            </p:txBody>
+          </p:sp>
+          <p:sp>
+            <p:nvSpPr>
+              <p:cNvPr id="62" name="文本框 61">
+                <a:extLst>
+                  <a:ext uri="{FF2B5EF4-FFF2-40B4-BE49-F238E27FC236}">
+                    <a16:creationId xmlns:a16="http://schemas.microsoft.com/office/drawing/2014/main" id="{C88A6E63-2D43-46C5-ABA7-8BED262F6862}"/>
+                  </a:ext>
+                </a:extLst>
+              </p:cNvPr>
+              <p:cNvSpPr txBox="1"/>
+              <p:nvPr/>
+            </p:nvSpPr>
+            <p:spPr>
+              <a:xfrm>
+                <a:off x="8002081" y="856427"/>
+                <a:ext cx="1180131" cy="400110"/>
+              </a:xfrm>
+              <a:prstGeom prst="rect">
+                <a:avLst/>
+              </a:prstGeom>
+              <a:noFill/>
+            </p:spPr>
+            <p:txBody>
+              <a:bodyPr wrap="none" rtlCol="0">
+                <a:spAutoFit/>
+              </a:bodyPr>
+              <a:lstStyle/>
+              <a:p>
+                <a:r>
+                  <a:rPr lang="zh-CN" altLang="en-US" sz="1000" dirty="0"/>
+                  <a:t>新</a:t>
+                </a:r>
+                <a:r>
+                  <a:rPr lang="en-US" altLang="zh-CN" sz="1000" dirty="0"/>
+                  <a:t>new</a:t>
+                </a:r>
+                <a:r>
+                  <a:rPr lang="zh-CN" altLang="en-US" sz="1000" dirty="0"/>
+                  <a:t>的局部变量</a:t>
+                </a:r>
+                <a:endParaRPr lang="en-US" altLang="zh-CN" sz="1000" dirty="0"/>
+              </a:p>
+              <a:p>
+                <a:r>
+                  <a:rPr lang="en-US" altLang="zh-CN" sz="1000" dirty="0"/>
+                  <a:t>user1</a:t>
+                </a:r>
+                <a:r>
+                  <a:rPr lang="zh-CN" altLang="en-US" sz="1000" dirty="0"/>
+                  <a:t>存放在栈中</a:t>
+                </a:r>
+              </a:p>
+            </p:txBody>
+          </p:sp>
+          <p:sp>
+            <p:nvSpPr>
+              <p:cNvPr id="65" name="矩形: 圆角 64">
+                <a:extLst>
+                  <a:ext uri="{FF2B5EF4-FFF2-40B4-BE49-F238E27FC236}">
+                    <a16:creationId xmlns:a16="http://schemas.microsoft.com/office/drawing/2014/main" id="{F5D374C2-3B4C-4EED-ACE5-BF2E5BA62103}"/>
+                  </a:ext>
+                </a:extLst>
+              </p:cNvPr>
+              <p:cNvSpPr/>
+              <p:nvPr/>
+            </p:nvSpPr>
+            <p:spPr>
+              <a:xfrm>
+                <a:off x="2861028" y="3374277"/>
+                <a:ext cx="1560556" cy="323020"/>
+              </a:xfrm>
+              <a:prstGeom prst="roundRect">
+                <a:avLst/>
+              </a:prstGeom>
+            </p:spPr>
+            <p:style>
+              <a:lnRef idx="1">
+                <a:schemeClr val="accent6"/>
+              </a:lnRef>
+              <a:fillRef idx="3">
+                <a:schemeClr val="accent6"/>
+              </a:fillRef>
+              <a:effectRef idx="2">
+                <a:schemeClr val="accent6"/>
+              </a:effectRef>
+              <a:fontRef idx="minor">
+                <a:schemeClr val="lt1"/>
+              </a:fontRef>
+            </p:style>
+            <p:txBody>
+              <a:bodyPr rtlCol="0" anchor="ctr"/>
+              <a:lstStyle/>
+              <a:p>
+                <a:pPr algn="ctr"/>
+                <a:r>
+                  <a:rPr lang="en-US" altLang="zh-CN" sz="1200" dirty="0"/>
+                  <a:t>Employee {age=20}</a:t>
+                </a:r>
+              </a:p>
+            </p:txBody>
+          </p:sp>
+          <p:sp>
+            <p:nvSpPr>
+              <p:cNvPr id="66" name="矩形: 圆角 65">
+                <a:extLst>
+                  <a:ext uri="{FF2B5EF4-FFF2-40B4-BE49-F238E27FC236}">
+                    <a16:creationId xmlns:a16="http://schemas.microsoft.com/office/drawing/2014/main" id="{443B33C8-FE0D-45D2-AAF2-15374577653C}"/>
+                  </a:ext>
+                </a:extLst>
+              </p:cNvPr>
+              <p:cNvSpPr/>
+              <p:nvPr/>
+            </p:nvSpPr>
+            <p:spPr>
+              <a:xfrm>
+                <a:off x="2861028" y="3812712"/>
+                <a:ext cx="1560556" cy="323020"/>
+              </a:xfrm>
+              <a:prstGeom prst="roundRect">
+                <a:avLst/>
+              </a:prstGeom>
+            </p:spPr>
+            <p:style>
+              <a:lnRef idx="1">
+                <a:schemeClr val="accent6"/>
+              </a:lnRef>
+              <a:fillRef idx="3">
+                <a:schemeClr val="accent6"/>
+              </a:fillRef>
+              <a:effectRef idx="2">
+                <a:schemeClr val="accent6"/>
+              </a:effectRef>
+              <a:fontRef idx="minor">
+                <a:schemeClr val="lt1"/>
+              </a:fontRef>
+            </p:style>
+            <p:txBody>
+              <a:bodyPr rtlCol="0" anchor="ctr"/>
+              <a:lstStyle/>
+              <a:p>
+                <a:pPr algn="ctr"/>
+                <a:r>
+                  <a:rPr lang="en-US" altLang="zh-CN" sz="1200" dirty="0"/>
+                  <a:t>[1,2,3,4,5]</a:t>
+                </a:r>
+              </a:p>
+            </p:txBody>
+          </p:sp>
+          <p:sp>
+            <p:nvSpPr>
+              <p:cNvPr id="71" name="文本框 70">
+                <a:extLst>
+                  <a:ext uri="{FF2B5EF4-FFF2-40B4-BE49-F238E27FC236}">
+                    <a16:creationId xmlns:a16="http://schemas.microsoft.com/office/drawing/2014/main" id="{9A91630B-8B6D-44E1-BAF4-63F68D3B1DC2}"/>
+                  </a:ext>
+                </a:extLst>
+              </p:cNvPr>
+              <p:cNvSpPr txBox="1"/>
+              <p:nvPr/>
+            </p:nvSpPr>
+            <p:spPr>
+              <a:xfrm>
+                <a:off x="2707660" y="888552"/>
+                <a:ext cx="585417" cy="307777"/>
+              </a:xfrm>
+              <a:prstGeom prst="rect">
+                <a:avLst/>
+              </a:prstGeom>
+              <a:noFill/>
+            </p:spPr>
+            <p:txBody>
+              <a:bodyPr wrap="none" rtlCol="0">
+                <a:spAutoFit/>
+              </a:bodyPr>
+              <a:lstStyle/>
+              <a:p>
+                <a:r>
+                  <a:rPr lang="en-US" altLang="zh-CN" sz="1400" b="1" dirty="0"/>
+                  <a:t>Eden</a:t>
+                </a:r>
+                <a:endParaRPr lang="zh-CN" altLang="en-US" sz="1400" b="1" dirty="0"/>
+              </a:p>
+            </p:txBody>
+          </p:sp>
+          <p:sp>
+            <p:nvSpPr>
+              <p:cNvPr id="77" name="文本框 76">
+                <a:extLst>
+                  <a:ext uri="{FF2B5EF4-FFF2-40B4-BE49-F238E27FC236}">
+                    <a16:creationId xmlns:a16="http://schemas.microsoft.com/office/drawing/2014/main" id="{B1224A4B-B2A6-4608-98A4-FB1F70ACFE12}"/>
+                  </a:ext>
+                </a:extLst>
+              </p:cNvPr>
+              <p:cNvSpPr txBox="1"/>
+              <p:nvPr/>
+            </p:nvSpPr>
+            <p:spPr>
+              <a:xfrm>
+                <a:off x="2706027" y="2060067"/>
+                <a:ext cx="922047" cy="307777"/>
+              </a:xfrm>
+              <a:prstGeom prst="rect">
+                <a:avLst/>
+              </a:prstGeom>
+              <a:noFill/>
+            </p:spPr>
+            <p:txBody>
+              <a:bodyPr wrap="none" rtlCol="0">
+                <a:spAutoFit/>
+              </a:bodyPr>
+              <a:lstStyle/>
+              <a:p>
+                <a:r>
+                  <a:rPr lang="en-US" altLang="zh-CN" sz="1400" b="1" dirty="0"/>
+                  <a:t>From(S0)</a:t>
+                </a:r>
+                <a:endParaRPr lang="zh-CN" altLang="en-US" sz="1400" b="1" dirty="0"/>
+              </a:p>
+            </p:txBody>
+          </p:sp>
+          <p:sp>
+            <p:nvSpPr>
+              <p:cNvPr id="78" name="文本框 77">
+                <a:extLst>
+                  <a:ext uri="{FF2B5EF4-FFF2-40B4-BE49-F238E27FC236}">
+                    <a16:creationId xmlns:a16="http://schemas.microsoft.com/office/drawing/2014/main" id="{0EDE7B4D-FA88-4AB5-AE8C-E580F955D9B5}"/>
+                  </a:ext>
+                </a:extLst>
+              </p:cNvPr>
+              <p:cNvSpPr txBox="1"/>
+              <p:nvPr/>
+            </p:nvSpPr>
+            <p:spPr>
+              <a:xfrm>
+                <a:off x="2708494" y="2612422"/>
+                <a:ext cx="707245" cy="307777"/>
+              </a:xfrm>
+              <a:prstGeom prst="rect">
+                <a:avLst/>
+              </a:prstGeom>
+              <a:noFill/>
+            </p:spPr>
+            <p:txBody>
+              <a:bodyPr wrap="none" rtlCol="0">
+                <a:spAutoFit/>
+              </a:bodyPr>
+              <a:lstStyle/>
+              <a:p>
+                <a:r>
+                  <a:rPr lang="en-US" altLang="zh-CN" sz="1400" b="1" dirty="0"/>
+                  <a:t>To(S1)</a:t>
+                </a:r>
+                <a:endParaRPr lang="zh-CN" altLang="en-US" sz="1400" b="1" dirty="0"/>
+              </a:p>
+            </p:txBody>
+          </p:sp>
+          <p:sp>
+            <p:nvSpPr>
+              <p:cNvPr id="72" name="椭圆 71">
+                <a:extLst>
+                  <a:ext uri="{FF2B5EF4-FFF2-40B4-BE49-F238E27FC236}">
+                    <a16:creationId xmlns:a16="http://schemas.microsoft.com/office/drawing/2014/main" id="{F60780E2-1308-41D1-8EFA-EB6BF65D8FE8}"/>
+                  </a:ext>
+                </a:extLst>
+              </p:cNvPr>
+              <p:cNvSpPr/>
+              <p:nvPr/>
+            </p:nvSpPr>
+            <p:spPr>
+              <a:xfrm>
+                <a:off x="6652556" y="2858181"/>
+                <a:ext cx="769179" cy="726162"/>
+              </a:xfrm>
+              <a:prstGeom prst="ellipse">
+                <a:avLst/>
+              </a:prstGeom>
+            </p:spPr>
+            <p:style>
+              <a:lnRef idx="2">
+                <a:schemeClr val="accent1">
+                  <a:shade val="50000"/>
+                </a:schemeClr>
+              </a:lnRef>
+              <a:fillRef idx="1">
+                <a:schemeClr val="accent1"/>
+              </a:fillRef>
+              <a:effectRef idx="0">
+                <a:schemeClr val="accent1"/>
+              </a:effectRef>
+              <a:fontRef idx="minor">
+                <a:schemeClr val="lt1"/>
+              </a:fontRef>
+            </p:style>
+            <p:txBody>
+              <a:bodyPr rtlCol="0" anchor="ctr"/>
+              <a:lstStyle/>
+              <a:p>
+                <a:pPr algn="ctr"/>
+                <a:r>
+                  <a:rPr lang="en-US" altLang="zh-CN" dirty="0"/>
+                  <a:t>GC</a:t>
+                </a:r>
+                <a:endParaRPr lang="zh-CN" altLang="en-US" dirty="0"/>
+              </a:p>
+            </p:txBody>
+          </p:sp>
+          <p:cxnSp>
+            <p:nvCxnSpPr>
+              <p:cNvPr id="75" name="连接符: 肘形 74">
+                <a:extLst>
+                  <a:ext uri="{FF2B5EF4-FFF2-40B4-BE49-F238E27FC236}">
+                    <a16:creationId xmlns:a16="http://schemas.microsoft.com/office/drawing/2014/main" id="{638D0A4A-7294-4182-93C3-D7C2B2E96145}"/>
+                  </a:ext>
+                </a:extLst>
+              </p:cNvPr>
+              <p:cNvCxnSpPr>
+                <a:cxnSpLocks/>
+                <a:stCxn id="72" idx="2"/>
+              </p:cNvCxnSpPr>
+              <p:nvPr/>
+            </p:nvCxnSpPr>
+            <p:spPr>
+              <a:xfrm rot="10800000" flipV="1">
+                <a:off x="4555622" y="3221262"/>
+                <a:ext cx="2096935" cy="908616"/>
+              </a:xfrm>
+              <a:prstGeom prst="bentConnector3">
+                <a:avLst/>
+              </a:prstGeom>
+              <a:ln>
+                <a:tailEnd type="triangle"/>
+              </a:ln>
+            </p:spPr>
+            <p:style>
+              <a:lnRef idx="1">
+                <a:schemeClr val="accent1"/>
+              </a:lnRef>
+              <a:fillRef idx="0">
+                <a:schemeClr val="accent1"/>
+              </a:fillRef>
+              <a:effectRef idx="0">
+                <a:schemeClr val="accent1"/>
+              </a:effectRef>
+              <a:fontRef idx="minor">
+                <a:schemeClr val="tx1"/>
+              </a:fontRef>
+            </p:style>
+          </p:cxnSp>
+          <p:sp>
+            <p:nvSpPr>
+              <p:cNvPr id="88" name="文本框 87">
+                <a:extLst>
+                  <a:ext uri="{FF2B5EF4-FFF2-40B4-BE49-F238E27FC236}">
+                    <a16:creationId xmlns:a16="http://schemas.microsoft.com/office/drawing/2014/main" id="{77FECEFD-81B0-4A31-91DC-25D9889082C9}"/>
+                  </a:ext>
+                </a:extLst>
+              </p:cNvPr>
+              <p:cNvSpPr txBox="1"/>
+              <p:nvPr/>
+            </p:nvSpPr>
+            <p:spPr>
+              <a:xfrm>
+                <a:off x="4695102" y="3285704"/>
+                <a:ext cx="1957452" cy="1323439"/>
+              </a:xfrm>
+              <a:prstGeom prst="rect">
+                <a:avLst/>
+              </a:prstGeom>
+              <a:noFill/>
+            </p:spPr>
+            <p:txBody>
+              <a:bodyPr wrap="square" rtlCol="0">
+                <a:spAutoFit/>
+              </a:bodyPr>
+              <a:lstStyle/>
+              <a:p>
+                <a:r>
+                  <a:rPr lang="zh-CN" altLang="en-US" sz="1000" b="1" dirty="0"/>
+                  <a:t>分代收集算法</a:t>
+                </a:r>
+                <a:endParaRPr lang="en-US" altLang="zh-CN" sz="1000" dirty="0"/>
+              </a:p>
+              <a:p>
+                <a:r>
+                  <a:rPr lang="zh-CN" altLang="en-US" sz="1000" dirty="0"/>
+                  <a:t>每次</a:t>
+                </a:r>
+                <a:r>
+                  <a:rPr lang="en-US" altLang="zh-CN" sz="1000" dirty="0"/>
+                  <a:t>GC</a:t>
+                </a:r>
+                <a:r>
+                  <a:rPr lang="zh-CN" altLang="en-US" sz="1000" dirty="0"/>
+                  <a:t>一次新生代，判断对象有没有被引用如果对象被引用则年龄</a:t>
+                </a:r>
+                <a:r>
+                  <a:rPr lang="en-US" altLang="zh-CN" sz="1000" dirty="0"/>
+                  <a:t>+1,</a:t>
+                </a:r>
+                <a:r>
+                  <a:rPr lang="zh-CN" altLang="en-US" sz="1000" dirty="0"/>
+                  <a:t>达到一定年龄后对象被存放到老年代</a:t>
+                </a:r>
+                <a:endParaRPr lang="en-US" altLang="zh-CN" sz="1000" dirty="0"/>
+              </a:p>
+              <a:p>
+                <a:endParaRPr lang="en-US" altLang="zh-CN" sz="1000" dirty="0"/>
+              </a:p>
+              <a:p>
+                <a:r>
+                  <a:rPr lang="zh-CN" altLang="en-US" sz="1000" dirty="0"/>
+                  <a:t>经过</a:t>
+                </a:r>
+                <a:r>
+                  <a:rPr lang="en-US" altLang="zh-CN" sz="1000" dirty="0"/>
+                  <a:t>N</a:t>
+                </a:r>
+                <a:r>
+                  <a:rPr lang="zh-CN" altLang="en-US" sz="1000" dirty="0"/>
+                  <a:t>次</a:t>
+                </a:r>
+                <a:r>
+                  <a:rPr lang="en-US" altLang="zh-CN" sz="1000" dirty="0"/>
+                  <a:t>GC</a:t>
+                </a:r>
+                <a:r>
+                  <a:rPr lang="zh-CN" altLang="en-US" sz="1000" dirty="0"/>
+                  <a:t>后比较稳定的</a:t>
+                </a:r>
+                <a:endParaRPr lang="en-US" altLang="zh-CN" sz="1000" dirty="0"/>
+              </a:p>
+              <a:p>
+                <a:r>
+                  <a:rPr lang="zh-CN" altLang="en-US" sz="1000" dirty="0"/>
+                  <a:t>对象实例存放在老年代</a:t>
+                </a:r>
+              </a:p>
+            </p:txBody>
+          </p:sp>
+          <p:cxnSp>
+            <p:nvCxnSpPr>
+              <p:cNvPr id="80" name="连接符: 肘形 79">
+                <a:extLst>
+                  <a:ext uri="{FF2B5EF4-FFF2-40B4-BE49-F238E27FC236}">
+                    <a16:creationId xmlns:a16="http://schemas.microsoft.com/office/drawing/2014/main" id="{4F16B0A7-4D68-47F0-BFD1-59438474A488}"/>
+                  </a:ext>
+                </a:extLst>
+              </p:cNvPr>
+              <p:cNvCxnSpPr>
+                <a:cxnSpLocks/>
+                <a:stCxn id="72" idx="0"/>
+                <a:endCxn id="93" idx="3"/>
+              </p:cNvCxnSpPr>
+              <p:nvPr/>
+            </p:nvCxnSpPr>
+            <p:spPr>
+              <a:xfrm rot="16200000" flipV="1">
+                <a:off x="6034035" y="1855069"/>
+                <a:ext cx="234073" cy="1772151"/>
+              </a:xfrm>
+              <a:prstGeom prst="bentConnector2">
+                <a:avLst/>
+              </a:prstGeom>
+              <a:ln>
+                <a:tailEnd type="triangle"/>
+              </a:ln>
+            </p:spPr>
+            <p:style>
+              <a:lnRef idx="1">
+                <a:schemeClr val="accent1"/>
+              </a:lnRef>
+              <a:fillRef idx="0">
+                <a:schemeClr val="accent1"/>
+              </a:fillRef>
+              <a:effectRef idx="0">
+                <a:schemeClr val="accent1"/>
+              </a:effectRef>
+              <a:fontRef idx="minor">
+                <a:schemeClr val="tx1"/>
+              </a:fontRef>
+            </p:style>
+          </p:cxnSp>
+          <p:cxnSp>
+            <p:nvCxnSpPr>
+              <p:cNvPr id="83" name="连接符: 肘形 82">
+                <a:extLst>
+                  <a:ext uri="{FF2B5EF4-FFF2-40B4-BE49-F238E27FC236}">
+                    <a16:creationId xmlns:a16="http://schemas.microsoft.com/office/drawing/2014/main" id="{CBC69032-A714-4F12-A652-A5EBDF313068}"/>
+                  </a:ext>
+                </a:extLst>
+              </p:cNvPr>
+              <p:cNvCxnSpPr>
+                <a:cxnSpLocks/>
+              </p:cNvCxnSpPr>
+              <p:nvPr/>
+            </p:nvCxnSpPr>
+            <p:spPr>
+              <a:xfrm rot="16200000" flipV="1">
+                <a:off x="6014208" y="1870755"/>
+                <a:ext cx="273726" cy="1772150"/>
+              </a:xfrm>
+              <a:prstGeom prst="bentConnector2">
+                <a:avLst/>
+              </a:prstGeom>
+              <a:ln>
+                <a:tailEnd type="triangle"/>
+              </a:ln>
+            </p:spPr>
+            <p:style>
+              <a:lnRef idx="1">
+                <a:schemeClr val="accent1"/>
+              </a:lnRef>
+              <a:fillRef idx="0">
+                <a:schemeClr val="accent1"/>
+              </a:fillRef>
+              <a:effectRef idx="0">
+                <a:schemeClr val="accent1"/>
+              </a:effectRef>
+              <a:fontRef idx="minor">
+                <a:schemeClr val="tx1"/>
+              </a:fontRef>
+            </p:style>
+          </p:cxnSp>
+          <p:pic>
+            <p:nvPicPr>
+              <p:cNvPr id="93" name="图片 92">
+                <a:extLst>
+                  <a:ext uri="{FF2B5EF4-FFF2-40B4-BE49-F238E27FC236}">
+                    <a16:creationId xmlns:a16="http://schemas.microsoft.com/office/drawing/2014/main" id="{874C0BA4-21A4-4159-8A04-426D6AF5C7F1}"/>
+                  </a:ext>
+                </a:extLst>
+              </p:cNvPr>
+              <p:cNvPicPr>
+                <a:picLocks noChangeAspect="1"/>
+              </p:cNvPicPr>
+              <p:nvPr/>
+            </p:nvPicPr>
+            <p:blipFill>
+              <a:blip r:embed="rId3">
+                <a:extLst>
+                  <a:ext uri="{28A0092B-C50C-407E-A947-70E740481C1C}">
+                    <a14:useLocalDpi xmlns:a14="http://schemas.microsoft.com/office/drawing/2010/main" val="0"/>
+                  </a:ext>
+                </a:extLst>
+              </a:blip>
+              <a:stretch>
+                <a:fillRect/>
+              </a:stretch>
+            </p:blipFill>
+            <p:spPr>
+              <a:xfrm>
+                <a:off x="4940205" y="2461713"/>
+                <a:ext cx="324790" cy="324790"/>
+              </a:xfrm>
+              <a:prstGeom prst="rect">
+                <a:avLst/>
+              </a:prstGeom>
+            </p:spPr>
+          </p:pic>
+          <p:sp>
+            <p:nvSpPr>
+              <p:cNvPr id="95" name="矩形 94">
+                <a:extLst>
+                  <a:ext uri="{FF2B5EF4-FFF2-40B4-BE49-F238E27FC236}">
+                    <a16:creationId xmlns:a16="http://schemas.microsoft.com/office/drawing/2014/main" id="{17709567-6967-47C2-93EF-10516E52C4D6}"/>
+                  </a:ext>
+                </a:extLst>
+              </p:cNvPr>
+              <p:cNvSpPr/>
+              <p:nvPr/>
+            </p:nvSpPr>
+            <p:spPr>
+              <a:xfrm>
+                <a:off x="2716536" y="6015213"/>
+                <a:ext cx="1822645" cy="323020"/>
+              </a:xfrm>
+              <a:prstGeom prst="rect">
+                <a:avLst/>
+              </a:prstGeom>
+            </p:spPr>
+            <p:style>
+              <a:lnRef idx="1">
+                <a:schemeClr val="dk1"/>
+              </a:lnRef>
+              <a:fillRef idx="2">
+                <a:schemeClr val="dk1"/>
+              </a:fillRef>
+              <a:effectRef idx="1">
+                <a:schemeClr val="dk1"/>
+              </a:effectRef>
+              <a:fontRef idx="minor">
+                <a:schemeClr val="dk1"/>
+              </a:fontRef>
+            </p:style>
+            <p:txBody>
+              <a:bodyPr rtlCol="0" anchor="ctr"/>
+              <a:lstStyle/>
+              <a:p>
+                <a:pPr algn="ctr"/>
+                <a:r>
+                  <a:rPr lang="zh-CN" altLang="en-US" sz="1200" dirty="0"/>
+                  <a:t>空闲指针区</a:t>
+                </a:r>
+              </a:p>
+            </p:txBody>
+          </p:sp>
+          <p:cxnSp>
+            <p:nvCxnSpPr>
+              <p:cNvPr id="97" name="连接符: 肘形 96">
+                <a:extLst>
+                  <a:ext uri="{FF2B5EF4-FFF2-40B4-BE49-F238E27FC236}">
+                    <a16:creationId xmlns:a16="http://schemas.microsoft.com/office/drawing/2014/main" id="{4E675698-FBC8-4416-B5A3-F1A05B271049}"/>
+                  </a:ext>
+                </a:extLst>
+              </p:cNvPr>
+              <p:cNvCxnSpPr>
+                <a:cxnSpLocks/>
+                <a:stCxn id="72" idx="4"/>
+                <a:endCxn id="95" idx="3"/>
+              </p:cNvCxnSpPr>
+              <p:nvPr/>
+            </p:nvCxnSpPr>
+            <p:spPr>
+              <a:xfrm rot="5400000">
+                <a:off x="4491974" y="3631551"/>
+                <a:ext cx="2592380" cy="2497965"/>
+              </a:xfrm>
+              <a:prstGeom prst="bentConnector2">
+                <a:avLst/>
+              </a:prstGeom>
+              <a:ln>
+                <a:tailEnd type="triangle"/>
+              </a:ln>
+            </p:spPr>
+            <p:style>
+              <a:lnRef idx="1">
+                <a:schemeClr val="accent1"/>
+              </a:lnRef>
+              <a:fillRef idx="0">
+                <a:schemeClr val="accent1"/>
+              </a:fillRef>
+              <a:effectRef idx="0">
+                <a:schemeClr val="accent1"/>
+              </a:effectRef>
+              <a:fontRef idx="minor">
+                <a:schemeClr val="tx1"/>
+              </a:fontRef>
+            </p:style>
+          </p:cxnSp>
+          <p:sp>
+            <p:nvSpPr>
+              <p:cNvPr id="98" name="文本框 97">
+                <a:extLst>
+                  <a:ext uri="{FF2B5EF4-FFF2-40B4-BE49-F238E27FC236}">
+                    <a16:creationId xmlns:a16="http://schemas.microsoft.com/office/drawing/2014/main" id="{05902906-36FD-41F3-923E-C81A72133851}"/>
+                  </a:ext>
+                </a:extLst>
+              </p:cNvPr>
+              <p:cNvSpPr txBox="1"/>
+              <p:nvPr/>
+            </p:nvSpPr>
+            <p:spPr>
+              <a:xfrm>
+                <a:off x="4704787" y="5268690"/>
+                <a:ext cx="2266967" cy="1169551"/>
+              </a:xfrm>
+              <a:prstGeom prst="rect">
+                <a:avLst/>
+              </a:prstGeom>
+              <a:noFill/>
+            </p:spPr>
+            <p:txBody>
+              <a:bodyPr wrap="square" rtlCol="0">
+                <a:spAutoFit/>
+              </a:bodyPr>
+              <a:lstStyle/>
+              <a:p>
+                <a:r>
+                  <a:rPr lang="zh-CN" altLang="en-US" sz="1000" b="1" dirty="0"/>
+                  <a:t>标记</a:t>
+                </a:r>
+                <a:r>
+                  <a:rPr lang="en-US" altLang="zh-CN" sz="1000" b="1" dirty="0"/>
+                  <a:t>-</a:t>
+                </a:r>
+                <a:r>
+                  <a:rPr lang="zh-CN" altLang="en-US" sz="1000" b="1" dirty="0"/>
+                  <a:t>整理算法</a:t>
+                </a:r>
+                <a:r>
+                  <a:rPr lang="en-US" altLang="zh-CN" sz="1000" b="1" dirty="0"/>
+                  <a:t>(Mark-compact)</a:t>
+                </a:r>
+              </a:p>
+              <a:p>
+                <a:r>
+                  <a:rPr lang="en-US" altLang="zh-CN" sz="1000" dirty="0"/>
+                  <a:t>GC</a:t>
+                </a:r>
+                <a:r>
+                  <a:rPr lang="zh-CN" altLang="en-US" sz="1000" dirty="0"/>
+                  <a:t>在回收老年代内存区域时将空闲指针对象统一移动到一块内存区域中（通常是最后端），然后将这段区域整体回收。</a:t>
+                </a:r>
+                <a:endParaRPr lang="en-US" altLang="zh-CN" sz="1000" dirty="0"/>
+              </a:p>
+              <a:p>
+                <a:endParaRPr lang="en-US" altLang="zh-CN" sz="1000" dirty="0"/>
+              </a:p>
+              <a:p>
+                <a:r>
+                  <a:rPr lang="zh-CN" altLang="en-US" sz="1000" dirty="0"/>
+                  <a:t>解决了内存碎片问题</a:t>
+                </a:r>
+              </a:p>
+            </p:txBody>
+          </p:sp>
+          <p:cxnSp>
+            <p:nvCxnSpPr>
+              <p:cNvPr id="105" name="连接符: 肘形 104">
+                <a:extLst>
+                  <a:ext uri="{FF2B5EF4-FFF2-40B4-BE49-F238E27FC236}">
+                    <a16:creationId xmlns:a16="http://schemas.microsoft.com/office/drawing/2014/main" id="{CD618C3A-CB0B-4746-9224-359AC528E232}"/>
+                  </a:ext>
+                </a:extLst>
+              </p:cNvPr>
+              <p:cNvCxnSpPr>
+                <a:stCxn id="93" idx="1"/>
+                <a:endCxn id="10" idx="3"/>
+              </p:cNvCxnSpPr>
+              <p:nvPr/>
+            </p:nvCxnSpPr>
+            <p:spPr>
+              <a:xfrm rot="10800000">
+                <a:off x="4555617" y="2330258"/>
+                <a:ext cx="384588" cy="293851"/>
+              </a:xfrm>
+              <a:prstGeom prst="bentConnector3">
+                <a:avLst/>
+              </a:prstGeom>
+              <a:ln>
+                <a:tailEnd type="triangle"/>
+              </a:ln>
+            </p:spPr>
+            <p:style>
+              <a:lnRef idx="1">
+                <a:schemeClr val="accent1"/>
+              </a:lnRef>
+              <a:fillRef idx="0">
+                <a:schemeClr val="accent1"/>
+              </a:fillRef>
+              <a:effectRef idx="0">
+                <a:schemeClr val="accent1"/>
+              </a:effectRef>
+              <a:fontRef idx="minor">
+                <a:schemeClr val="tx1"/>
+              </a:fontRef>
+            </p:style>
+          </p:cxnSp>
+          <p:cxnSp>
+            <p:nvCxnSpPr>
+              <p:cNvPr id="107" name="连接符: 肘形 106">
+                <a:extLst>
+                  <a:ext uri="{FF2B5EF4-FFF2-40B4-BE49-F238E27FC236}">
+                    <a16:creationId xmlns:a16="http://schemas.microsoft.com/office/drawing/2014/main" id="{0ABFDF08-5EC6-43B6-94A0-A08239568451}"/>
+                  </a:ext>
+                </a:extLst>
+              </p:cNvPr>
+              <p:cNvCxnSpPr>
+                <a:stCxn id="93" idx="1"/>
+                <a:endCxn id="11" idx="3"/>
+              </p:cNvCxnSpPr>
+              <p:nvPr/>
+            </p:nvCxnSpPr>
+            <p:spPr>
+              <a:xfrm rot="10800000" flipV="1">
+                <a:off x="4555617" y="2624108"/>
+                <a:ext cx="384588" cy="287826"/>
+              </a:xfrm>
+              <a:prstGeom prst="bentConnector3">
+                <a:avLst/>
+              </a:prstGeom>
+              <a:ln>
+                <a:tailEnd type="triangle"/>
+              </a:ln>
+            </p:spPr>
+            <p:style>
+              <a:lnRef idx="1">
+                <a:schemeClr val="accent1"/>
+              </a:lnRef>
+              <a:fillRef idx="0">
+                <a:schemeClr val="accent1"/>
+              </a:fillRef>
+              <a:effectRef idx="0">
+                <a:schemeClr val="accent1"/>
+              </a:effectRef>
+              <a:fontRef idx="minor">
+                <a:schemeClr val="tx1"/>
+              </a:fontRef>
+            </p:style>
+          </p:cxnSp>
+        </p:grpSp>
+        <p:cxnSp>
+          <p:nvCxnSpPr>
+            <p:cNvPr id="112" name="连接符: 肘形 111">
+              <a:extLst>
+                <a:ext uri="{FF2B5EF4-FFF2-40B4-BE49-F238E27FC236}">
+                  <a16:creationId xmlns:a16="http://schemas.microsoft.com/office/drawing/2014/main" id="{8245DF43-FC0A-421B-97A6-F72FF1DE4F97}"/>
+                </a:ext>
+              </a:extLst>
+            </p:cNvPr>
+            <p:cNvCxnSpPr>
+              <a:cxnSpLocks/>
+              <a:stCxn id="72" idx="0"/>
+            </p:cNvCxnSpPr>
+            <p:nvPr/>
+          </p:nvCxnSpPr>
+          <p:spPr>
+            <a:xfrm rot="16200000" flipV="1">
+              <a:off x="6048142" y="1007531"/>
+              <a:ext cx="1085270" cy="2508475"/>
+            </a:xfrm>
+            <a:prstGeom prst="bentConnector2">
+              <a:avLst/>
+            </a:prstGeom>
+            <a:ln>
+              <a:tailEnd type="triangle"/>
+            </a:ln>
+          </p:spPr>
+          <p:style>
+            <a:lnRef idx="1">
+              <a:schemeClr val="accent1"/>
+            </a:lnRef>
+            <a:fillRef idx="0">
+              <a:schemeClr val="accent1"/>
+            </a:fillRef>
+            <a:effectRef idx="0">
+              <a:schemeClr val="accent1"/>
+            </a:effectRef>
+            <a:fontRef idx="minor">
+              <a:schemeClr val="tx1"/>
+            </a:fontRef>
+          </p:style>
+        </p:cxnSp>
+        <p:sp>
+          <p:nvSpPr>
+            <p:cNvPr id="118" name="文本框 117">
+              <a:extLst>
+                <a:ext uri="{FF2B5EF4-FFF2-40B4-BE49-F238E27FC236}">
+                  <a16:creationId xmlns:a16="http://schemas.microsoft.com/office/drawing/2014/main" id="{41A169E0-95BD-4325-9CFB-06F60511D628}"/>
+                </a:ext>
+              </a:extLst>
+            </p:cNvPr>
+            <p:cNvSpPr txBox="1"/>
+            <p:nvPr/>
+          </p:nvSpPr>
+          <p:spPr>
+            <a:xfrm>
+              <a:off x="8149792" y="1692600"/>
+              <a:ext cx="1700542" cy="1477328"/>
+            </a:xfrm>
+            <a:prstGeom prst="rect">
+              <a:avLst/>
+            </a:prstGeom>
+            <a:noFill/>
+          </p:spPr>
+          <p:txBody>
+            <a:bodyPr wrap="square" rtlCol="0">
+              <a:spAutoFit/>
+            </a:bodyPr>
+            <a:lstStyle/>
+            <a:p>
+              <a:r>
+                <a:rPr lang="zh-CN" altLang="en-US" sz="1000" b="1" dirty="0"/>
+                <a:t>复制算法</a:t>
+              </a:r>
+              <a:r>
+                <a:rPr lang="en-US" altLang="zh-CN" sz="1000" b="1" dirty="0"/>
+                <a:t>(Copying)</a:t>
+              </a:r>
+            </a:p>
+            <a:p>
+              <a:r>
+                <a:rPr lang="zh-CN" altLang="en-US" sz="1000" dirty="0"/>
+                <a:t>回收</a:t>
+              </a:r>
+              <a:r>
+                <a:rPr lang="en-US" altLang="zh-CN" sz="1000" dirty="0" err="1"/>
+                <a:t>eden</a:t>
+              </a:r>
+              <a:r>
+                <a:rPr lang="zh-CN" altLang="en-US" sz="1000" dirty="0"/>
+                <a:t>区中对象时先将</a:t>
+              </a:r>
+              <a:r>
+                <a:rPr lang="en-US" altLang="zh-CN" sz="1000" dirty="0" err="1"/>
+                <a:t>enden</a:t>
+              </a:r>
+              <a:r>
+                <a:rPr lang="zh-CN" altLang="en-US" sz="1000" dirty="0"/>
+                <a:t>中存活的对象复制到</a:t>
+              </a:r>
+              <a:r>
+                <a:rPr lang="en-US" altLang="zh-CN" sz="1000" dirty="0"/>
+                <a:t>S0</a:t>
+              </a:r>
+              <a:r>
+                <a:rPr lang="zh-CN" altLang="en-US" sz="1000" dirty="0"/>
+                <a:t>中，然后清空</a:t>
+              </a:r>
+              <a:r>
+                <a:rPr lang="en-US" altLang="zh-CN" sz="1000" dirty="0" err="1"/>
+                <a:t>eden</a:t>
+              </a:r>
+              <a:r>
+                <a:rPr lang="zh-CN" altLang="en-US" sz="1000" dirty="0"/>
+                <a:t>区</a:t>
+              </a:r>
+              <a:endParaRPr lang="en-US" altLang="zh-CN" sz="1000" dirty="0"/>
+            </a:p>
+            <a:p>
+              <a:r>
+                <a:rPr lang="zh-CN" altLang="en-US" sz="1000" dirty="0"/>
+                <a:t>如果</a:t>
+              </a:r>
+              <a:r>
+                <a:rPr lang="en-US" altLang="zh-CN" sz="1000" dirty="0"/>
+                <a:t>S0</a:t>
+              </a:r>
+              <a:r>
+                <a:rPr lang="zh-CN" altLang="en-US" sz="1000" dirty="0"/>
+                <a:t>区已满，则将</a:t>
+              </a:r>
+              <a:r>
+                <a:rPr lang="en-US" altLang="zh-CN" sz="1000" dirty="0" err="1"/>
+                <a:t>eden</a:t>
+              </a:r>
+              <a:r>
+                <a:rPr lang="zh-CN" altLang="en-US" sz="1000" dirty="0"/>
+                <a:t>和</a:t>
+              </a:r>
+              <a:r>
+                <a:rPr lang="en-US" altLang="zh-CN" sz="1000" dirty="0"/>
+                <a:t>S0</a:t>
+              </a:r>
+              <a:r>
+                <a:rPr lang="zh-CN" altLang="en-US" sz="1000" dirty="0"/>
+                <a:t>中存活的对象复制到</a:t>
+              </a:r>
+              <a:r>
+                <a:rPr lang="en-US" altLang="zh-CN" sz="1000" dirty="0"/>
+                <a:t>S1,</a:t>
+              </a:r>
+              <a:r>
+                <a:rPr lang="zh-CN" altLang="en-US" sz="1000" dirty="0"/>
+                <a:t>然后清空</a:t>
+              </a:r>
+              <a:r>
+                <a:rPr lang="en-US" altLang="zh-CN" sz="1000" dirty="0" err="1"/>
+                <a:t>eden</a:t>
+              </a:r>
+              <a:r>
+                <a:rPr lang="zh-CN" altLang="en-US" sz="1000" dirty="0"/>
+                <a:t>和</a:t>
+              </a:r>
+              <a:r>
+                <a:rPr lang="en-US" altLang="zh-CN" sz="1000" dirty="0"/>
+                <a:t>S0,</a:t>
+              </a:r>
+            </a:p>
+            <a:p>
+              <a:r>
+                <a:rPr lang="zh-CN" altLang="en-US" sz="1000" dirty="0"/>
+                <a:t>最后将</a:t>
+              </a:r>
+              <a:r>
+                <a:rPr lang="en-US" altLang="zh-CN" sz="1000" dirty="0"/>
+                <a:t>S0</a:t>
+              </a:r>
+              <a:r>
+                <a:rPr lang="zh-CN" altLang="en-US" sz="1000" dirty="0"/>
+                <a:t>和</a:t>
+              </a:r>
+              <a:r>
+                <a:rPr lang="en-US" altLang="zh-CN" sz="1000" dirty="0"/>
+                <a:t>S1</a:t>
+              </a:r>
+              <a:r>
+                <a:rPr lang="zh-CN" altLang="en-US" sz="1000" dirty="0"/>
+                <a:t>互换</a:t>
+              </a:r>
+              <a:endParaRPr lang="en-US" altLang="zh-CN" sz="1000" dirty="0"/>
+            </a:p>
+            <a:p>
+              <a:r>
+                <a:rPr lang="zh-CN" altLang="en-US" sz="1000" dirty="0"/>
+                <a:t>保持</a:t>
+              </a:r>
+              <a:r>
+                <a:rPr lang="en-US" altLang="zh-CN" sz="1000" dirty="0"/>
+                <a:t>S1</a:t>
+              </a:r>
+              <a:r>
+                <a:rPr lang="zh-CN" altLang="en-US" sz="1000" dirty="0"/>
+                <a:t>为空</a:t>
+              </a:r>
+            </a:p>
+          </p:txBody>
+        </p:sp>
+        <p:sp>
+          <p:nvSpPr>
+            <p:cNvPr id="47" name="矩形: 圆角 46">
+              <a:extLst>
+                <a:ext uri="{FF2B5EF4-FFF2-40B4-BE49-F238E27FC236}">
+                  <a16:creationId xmlns:a16="http://schemas.microsoft.com/office/drawing/2014/main" id="{16ED9D3C-DE15-4656-AC2A-E09AB601F82E}"/>
+                </a:ext>
+              </a:extLst>
+            </p:cNvPr>
+            <p:cNvSpPr/>
+            <p:nvPr/>
+          </p:nvSpPr>
+          <p:spPr>
+            <a:xfrm>
+              <a:off x="10219157" y="3702187"/>
+              <a:ext cx="1560556" cy="323020"/>
+            </a:xfrm>
+            <a:prstGeom prst="roundRect">
+              <a:avLst/>
+            </a:prstGeom>
+          </p:spPr>
+          <p:style>
+            <a:lnRef idx="1">
+              <a:schemeClr val="accent6"/>
+            </a:lnRef>
+            <a:fillRef idx="3">
+              <a:schemeClr val="accent6"/>
+            </a:fillRef>
+            <a:effectRef idx="2">
+              <a:schemeClr val="accent6"/>
+            </a:effectRef>
+            <a:fontRef idx="minor">
+              <a:schemeClr val="lt1"/>
+            </a:fontRef>
+          </p:style>
+          <p:txBody>
+            <a:bodyPr rtlCol="0" anchor="ctr"/>
+            <a:lstStyle/>
+            <a:p>
+              <a:pPr algn="ctr"/>
+              <a:r>
+                <a:rPr lang="en-US" altLang="zh-CN" sz="1200" dirty="0"/>
+                <a:t>int  </a:t>
+              </a:r>
+              <a:r>
+                <a:rPr lang="en-US" altLang="zh-CN" sz="1200" dirty="0" err="1"/>
+                <a:t>i</a:t>
+              </a:r>
+              <a:r>
+                <a:rPr lang="en-US" altLang="zh-CN" sz="1200" dirty="0"/>
+                <a:t>=0;</a:t>
+              </a:r>
+            </a:p>
+          </p:txBody>
+        </p:sp>
+        <p:cxnSp>
+          <p:nvCxnSpPr>
+            <p:cNvPr id="14" name="连接符: 肘形 13">
+              <a:extLst>
+                <a:ext uri="{FF2B5EF4-FFF2-40B4-BE49-F238E27FC236}">
+                  <a16:creationId xmlns:a16="http://schemas.microsoft.com/office/drawing/2014/main" id="{0505AA49-D079-4BC5-B7C1-A7DF3246E98A}"/>
+                </a:ext>
+              </a:extLst>
+            </p:cNvPr>
+            <p:cNvCxnSpPr>
+              <a:stCxn id="72" idx="5"/>
+              <a:endCxn id="47" idx="1"/>
+            </p:cNvCxnSpPr>
+            <p:nvPr/>
+          </p:nvCxnSpPr>
+          <p:spPr>
+            <a:xfrm rot="16200000" flipH="1">
+              <a:off x="8948321" y="2592860"/>
+              <a:ext cx="439475" cy="2102198"/>
+            </a:xfrm>
+            <a:prstGeom prst="bentConnector2">
+              <a:avLst/>
+            </a:prstGeom>
+            <a:ln>
+              <a:tailEnd type="triangle"/>
+            </a:ln>
+          </p:spPr>
+          <p:style>
+            <a:lnRef idx="1">
+              <a:schemeClr val="accent1"/>
+            </a:lnRef>
+            <a:fillRef idx="0">
+              <a:schemeClr val="accent1"/>
+            </a:fillRef>
+            <a:effectRef idx="0">
+              <a:schemeClr val="accent1"/>
+            </a:effectRef>
+            <a:fontRef idx="minor">
+              <a:schemeClr val="tx1"/>
+            </a:fontRef>
+          </p:style>
+        </p:cxnSp>
+        <p:sp>
+          <p:nvSpPr>
+            <p:cNvPr id="50" name="文本框 49">
+              <a:extLst>
+                <a:ext uri="{FF2B5EF4-FFF2-40B4-BE49-F238E27FC236}">
+                  <a16:creationId xmlns:a16="http://schemas.microsoft.com/office/drawing/2014/main" id="{7E1325EB-C5EF-4331-BCAD-2EA27255A574}"/>
+                </a:ext>
+              </a:extLst>
+            </p:cNvPr>
+            <p:cNvSpPr txBox="1"/>
+            <p:nvPr/>
+          </p:nvSpPr>
+          <p:spPr>
+            <a:xfrm>
+              <a:off x="8187820" y="3893646"/>
+              <a:ext cx="1700542" cy="707886"/>
+            </a:xfrm>
+            <a:prstGeom prst="rect">
+              <a:avLst/>
+            </a:prstGeom>
+            <a:noFill/>
+          </p:spPr>
+          <p:txBody>
+            <a:bodyPr wrap="square" rtlCol="0">
+              <a:spAutoFit/>
+            </a:bodyPr>
+            <a:lstStyle/>
+            <a:p>
+              <a:r>
+                <a:rPr lang="zh-CN" altLang="en-US" sz="1000" b="1" dirty="0"/>
+                <a:t>栈中基础类型参数回收</a:t>
+              </a:r>
+              <a:endParaRPr lang="en-US" altLang="zh-CN" sz="1000" b="1" dirty="0"/>
+            </a:p>
+            <a:p>
+              <a:r>
+                <a:rPr lang="zh-CN" altLang="en-US" sz="1000" dirty="0"/>
+                <a:t>当方法调用完成后</a:t>
+              </a:r>
+              <a:r>
+                <a:rPr lang="en-US" altLang="zh-CN" sz="1000" dirty="0"/>
+                <a:t>GC</a:t>
+              </a:r>
+              <a:r>
+                <a:rPr lang="zh-CN" altLang="en-US" sz="1000" dirty="0"/>
+                <a:t>直接将栈中基础类型的参数进行回收</a:t>
+              </a:r>
+            </a:p>
+          </p:txBody>
+        </p:sp>
+      </p:grpSp>
     </p:spTree>
     <p:extLst>
       <p:ext uri="{BB962C8B-B14F-4D97-AF65-F5344CB8AC3E}">

</xml_diff>